<commit_message>
flux 2D in English
</commit_message>
<xml_diff>
--- a/pics/2020-08-18-flux_2D/pics.pptx
+++ b/pics/2020-08-18-flux_2D/pics.pptx
@@ -8,9 +8,13 @@
     <p:sldId id="256" r:id="rId2"/>
     <p:sldId id="258" r:id="rId3"/>
     <p:sldId id="259" r:id="rId4"/>
-    <p:sldId id="260" r:id="rId5"/>
-    <p:sldId id="261" r:id="rId6"/>
-    <p:sldId id="262" r:id="rId7"/>
+    <p:sldId id="263" r:id="rId5"/>
+    <p:sldId id="260" r:id="rId6"/>
+    <p:sldId id="264" r:id="rId7"/>
+    <p:sldId id="261" r:id="rId8"/>
+    <p:sldId id="265" r:id="rId9"/>
+    <p:sldId id="262" r:id="rId10"/>
+    <p:sldId id="266" r:id="rId11"/>
   </p:sldIdLst>
   <p:sldSz cx="12192000" cy="6858000"/>
   <p:notesSz cx="6858000" cy="9144000"/>
@@ -264,7 +268,7 @@
           <a:p>
             <a:fld id="{3C786596-805F-45E7-98A8-D3442C4937F0}" type="datetimeFigureOut">
               <a:rPr lang="ko-KR" altLang="en-US" smtClean="0"/>
-              <a:t>2020-08-23</a:t>
+              <a:t>2023-04-27</a:t>
             </a:fld>
             <a:endParaRPr lang="ko-KR" altLang="en-US"/>
           </a:p>
@@ -462,7 +466,7 @@
           <a:p>
             <a:fld id="{3C786596-805F-45E7-98A8-D3442C4937F0}" type="datetimeFigureOut">
               <a:rPr lang="ko-KR" altLang="en-US" smtClean="0"/>
-              <a:t>2020-08-23</a:t>
+              <a:t>2023-04-27</a:t>
             </a:fld>
             <a:endParaRPr lang="ko-KR" altLang="en-US"/>
           </a:p>
@@ -670,7 +674,7 @@
           <a:p>
             <a:fld id="{3C786596-805F-45E7-98A8-D3442C4937F0}" type="datetimeFigureOut">
               <a:rPr lang="ko-KR" altLang="en-US" smtClean="0"/>
-              <a:t>2020-08-23</a:t>
+              <a:t>2023-04-27</a:t>
             </a:fld>
             <a:endParaRPr lang="ko-KR" altLang="en-US"/>
           </a:p>
@@ -868,7 +872,7 @@
           <a:p>
             <a:fld id="{3C786596-805F-45E7-98A8-D3442C4937F0}" type="datetimeFigureOut">
               <a:rPr lang="ko-KR" altLang="en-US" smtClean="0"/>
-              <a:t>2020-08-23</a:t>
+              <a:t>2023-04-27</a:t>
             </a:fld>
             <a:endParaRPr lang="ko-KR" altLang="en-US"/>
           </a:p>
@@ -1143,7 +1147,7 @@
           <a:p>
             <a:fld id="{3C786596-805F-45E7-98A8-D3442C4937F0}" type="datetimeFigureOut">
               <a:rPr lang="ko-KR" altLang="en-US" smtClean="0"/>
-              <a:t>2020-08-23</a:t>
+              <a:t>2023-04-27</a:t>
             </a:fld>
             <a:endParaRPr lang="ko-KR" altLang="en-US"/>
           </a:p>
@@ -1408,7 +1412,7 @@
           <a:p>
             <a:fld id="{3C786596-805F-45E7-98A8-D3442C4937F0}" type="datetimeFigureOut">
               <a:rPr lang="ko-KR" altLang="en-US" smtClean="0"/>
-              <a:t>2020-08-23</a:t>
+              <a:t>2023-04-27</a:t>
             </a:fld>
             <a:endParaRPr lang="ko-KR" altLang="en-US"/>
           </a:p>
@@ -1820,7 +1824,7 @@
           <a:p>
             <a:fld id="{3C786596-805F-45E7-98A8-D3442C4937F0}" type="datetimeFigureOut">
               <a:rPr lang="ko-KR" altLang="en-US" smtClean="0"/>
-              <a:t>2020-08-23</a:t>
+              <a:t>2023-04-27</a:t>
             </a:fld>
             <a:endParaRPr lang="ko-KR" altLang="en-US"/>
           </a:p>
@@ -1961,7 +1965,7 @@
           <a:p>
             <a:fld id="{3C786596-805F-45E7-98A8-D3442C4937F0}" type="datetimeFigureOut">
               <a:rPr lang="ko-KR" altLang="en-US" smtClean="0"/>
-              <a:t>2020-08-23</a:t>
+              <a:t>2023-04-27</a:t>
             </a:fld>
             <a:endParaRPr lang="ko-KR" altLang="en-US"/>
           </a:p>
@@ -2074,7 +2078,7 @@
           <a:p>
             <a:fld id="{3C786596-805F-45E7-98A8-D3442C4937F0}" type="datetimeFigureOut">
               <a:rPr lang="ko-KR" altLang="en-US" smtClean="0"/>
-              <a:t>2020-08-23</a:t>
+              <a:t>2023-04-27</a:t>
             </a:fld>
             <a:endParaRPr lang="ko-KR" altLang="en-US"/>
           </a:p>
@@ -2385,7 +2389,7 @@
           <a:p>
             <a:fld id="{3C786596-805F-45E7-98A8-D3442C4937F0}" type="datetimeFigureOut">
               <a:rPr lang="ko-KR" altLang="en-US" smtClean="0"/>
-              <a:t>2020-08-23</a:t>
+              <a:t>2023-04-27</a:t>
             </a:fld>
             <a:endParaRPr lang="ko-KR" altLang="en-US"/>
           </a:p>
@@ -2673,7 +2677,7 @@
           <a:p>
             <a:fld id="{3C786596-805F-45E7-98A8-D3442C4937F0}" type="datetimeFigureOut">
               <a:rPr lang="ko-KR" altLang="en-US" smtClean="0"/>
-              <a:t>2020-08-23</a:t>
+              <a:t>2023-04-27</a:t>
             </a:fld>
             <a:endParaRPr lang="ko-KR" altLang="en-US"/>
           </a:p>
@@ -2914,7 +2918,7 @@
           <a:p>
             <a:fld id="{3C786596-805F-45E7-98A8-D3442C4937F0}" type="datetimeFigureOut">
               <a:rPr lang="ko-KR" altLang="en-US" smtClean="0"/>
-              <a:t>2020-08-23</a:t>
+              <a:t>2023-04-27</a:t>
             </a:fld>
             <a:endParaRPr lang="ko-KR" altLang="en-US"/>
           </a:p>
@@ -3581,6 +3585,158 @@
     <p:extLst>
       <p:ext uri="{BB962C8B-B14F-4D97-AF65-F5344CB8AC3E}">
         <p14:creationId xmlns:p14="http://schemas.microsoft.com/office/powerpoint/2010/main" val="1635070969"/>
+      </p:ext>
+    </p:extLst>
+  </p:cSld>
+  <p:clrMapOvr>
+    <a:masterClrMapping/>
+  </p:clrMapOvr>
+</p:sld>
+</file>
+
+<file path=ppt/slides/slide10.xml><?xml version="1.0" encoding="utf-8"?>
+<p:sld xmlns:a="http://schemas.openxmlformats.org/drawingml/2006/main" xmlns:r="http://schemas.openxmlformats.org/officeDocument/2006/relationships" xmlns:p="http://schemas.openxmlformats.org/presentationml/2006/main">
+  <p:cSld>
+    <p:spTree>
+      <p:nvGrpSpPr>
+        <p:cNvPr id="1" name=""/>
+        <p:cNvGrpSpPr/>
+        <p:nvPr/>
+      </p:nvGrpSpPr>
+      <p:grpSpPr>
+        <a:xfrm>
+          <a:off x="0" y="0"/>
+          <a:ext cx="0" cy="0"/>
+          <a:chOff x="0" y="0"/>
+          <a:chExt cx="0" cy="0"/>
+        </a:xfrm>
+      </p:grpSpPr>
+      <p:pic>
+        <p:nvPicPr>
+          <p:cNvPr id="6" name="그림 5">
+            <a:extLst>
+              <a:ext uri="{FF2B5EF4-FFF2-40B4-BE49-F238E27FC236}">
+                <a16:creationId xmlns:a16="http://schemas.microsoft.com/office/drawing/2014/main" id="{3A3012DD-01AE-4FDE-9068-0D35F8A5623B}"/>
+              </a:ext>
+            </a:extLst>
+          </p:cNvPr>
+          <p:cNvPicPr>
+            <a:picLocks noChangeAspect="1"/>
+          </p:cNvPicPr>
+          <p:nvPr/>
+        </p:nvPicPr>
+        <p:blipFill>
+          <a:blip r:embed="rId2"/>
+          <a:stretch>
+            <a:fillRect/>
+          </a:stretch>
+        </p:blipFill>
+        <p:spPr>
+          <a:xfrm>
+            <a:off x="2749239" y="894080"/>
+            <a:ext cx="6693522" cy="5069840"/>
+          </a:xfrm>
+          <a:prstGeom prst="rect">
+            <a:avLst/>
+          </a:prstGeom>
+        </p:spPr>
+      </p:pic>
+      <p:sp>
+        <p:nvSpPr>
+          <p:cNvPr id="7" name="갈매기형 수장 12">
+            <a:extLst>
+              <a:ext uri="{FF2B5EF4-FFF2-40B4-BE49-F238E27FC236}">
+                <a16:creationId xmlns:a16="http://schemas.microsoft.com/office/drawing/2014/main" id="{188628A5-D079-4B38-9BE9-87EBC4C0294A}"/>
+              </a:ext>
+            </a:extLst>
+          </p:cNvPr>
+          <p:cNvSpPr/>
+          <p:nvPr/>
+        </p:nvSpPr>
+        <p:spPr>
+          <a:xfrm rot="12130572">
+            <a:off x="6450676" y="3190101"/>
+            <a:ext cx="193475" cy="307800"/>
+          </a:xfrm>
+          <a:prstGeom prst="chevron">
+            <a:avLst/>
+          </a:prstGeom>
+          <a:solidFill>
+            <a:schemeClr val="tx1"/>
+          </a:solidFill>
+          <a:ln>
+            <a:noFill/>
+          </a:ln>
+        </p:spPr>
+        <p:style>
+          <a:lnRef idx="2">
+            <a:schemeClr val="accent1">
+              <a:shade val="50000"/>
+            </a:schemeClr>
+          </a:lnRef>
+          <a:fillRef idx="1">
+            <a:schemeClr val="accent1"/>
+          </a:fillRef>
+          <a:effectRef idx="0">
+            <a:schemeClr val="accent1"/>
+          </a:effectRef>
+          <a:fontRef idx="minor">
+            <a:schemeClr val="lt1"/>
+          </a:fontRef>
+        </p:style>
+        <p:txBody>
+          <a:bodyPr rtlCol="0" anchor="ctr"/>
+          <a:lstStyle/>
+          <a:p>
+            <a:pPr algn="ctr"/>
+            <a:endParaRPr lang="ko-KR" altLang="en-US">
+              <a:solidFill>
+                <a:schemeClr val="tx1"/>
+              </a:solidFill>
+            </a:endParaRPr>
+          </a:p>
+        </p:txBody>
+      </p:sp>
+      <p:sp>
+        <p:nvSpPr>
+          <p:cNvPr id="9" name="TextBox 8">
+            <a:extLst>
+              <a:ext uri="{FF2B5EF4-FFF2-40B4-BE49-F238E27FC236}">
+                <a16:creationId xmlns:a16="http://schemas.microsoft.com/office/drawing/2014/main" id="{B41942B6-2124-405E-B9E2-8B8D7CBCDF0D}"/>
+              </a:ext>
+            </a:extLst>
+          </p:cNvPr>
+          <p:cNvSpPr txBox="1"/>
+          <p:nvPr/>
+        </p:nvSpPr>
+        <p:spPr>
+          <a:xfrm>
+            <a:off x="4958498" y="5938886"/>
+            <a:ext cx="4519699" cy="276999"/>
+          </a:xfrm>
+          <a:prstGeom prst="rect">
+            <a:avLst/>
+          </a:prstGeom>
+          <a:noFill/>
+        </p:spPr>
+        <p:txBody>
+          <a:bodyPr wrap="none" rtlCol="0">
+            <a:spAutoFit/>
+          </a:bodyPr>
+          <a:lstStyle/>
+          <a:p>
+            <a:r>
+              <a:rPr lang="en-US" altLang="ko-KR" sz="1200" dirty="0"/>
+              <a:t>※ The size of the arrow of the vector field is reduced to 40%.</a:t>
+            </a:r>
+            <a:endParaRPr lang="ko-KR" altLang="en-US" sz="1200" dirty="0"/>
+          </a:p>
+        </p:txBody>
+      </p:sp>
+    </p:spTree>
+    <p:extLst>
+      <p:ext uri="{BB962C8B-B14F-4D97-AF65-F5344CB8AC3E}">
+        <p14:creationId xmlns:p14="http://schemas.microsoft.com/office/powerpoint/2010/main" val="3399790046"/>
       </p:ext>
     </p:extLst>
   </p:cSld>
@@ -5232,6 +5388,1091 @@
           <a:chExt cx="0" cy="0"/>
         </a:xfrm>
       </p:grpSpPr>
+      <p:pic>
+        <p:nvPicPr>
+          <p:cNvPr id="9" name="그림 8">
+            <a:extLst>
+              <a:ext uri="{FF2B5EF4-FFF2-40B4-BE49-F238E27FC236}">
+                <a16:creationId xmlns:a16="http://schemas.microsoft.com/office/drawing/2014/main" id="{564CA83D-D2DC-4622-A4AD-1CC1CA6E5479}"/>
+              </a:ext>
+            </a:extLst>
+          </p:cNvPr>
+          <p:cNvPicPr>
+            <a:picLocks noChangeAspect="1"/>
+          </p:cNvPicPr>
+          <p:nvPr/>
+        </p:nvPicPr>
+        <p:blipFill>
+          <a:blip r:embed="rId2"/>
+          <a:stretch>
+            <a:fillRect/>
+          </a:stretch>
+        </p:blipFill>
+        <p:spPr>
+          <a:xfrm>
+            <a:off x="1469109" y="2437271"/>
+            <a:ext cx="2418287" cy="1808719"/>
+          </a:xfrm>
+          <a:prstGeom prst="rect">
+            <a:avLst/>
+          </a:prstGeom>
+        </p:spPr>
+      </p:pic>
+      <p:sp>
+        <p:nvSpPr>
+          <p:cNvPr id="10" name="직사각형 9">
+            <a:extLst>
+              <a:ext uri="{FF2B5EF4-FFF2-40B4-BE49-F238E27FC236}">
+                <a16:creationId xmlns:a16="http://schemas.microsoft.com/office/drawing/2014/main" id="{74DF345E-7831-48BA-BD7D-96830171290D}"/>
+              </a:ext>
+            </a:extLst>
+          </p:cNvPr>
+          <p:cNvSpPr/>
+          <p:nvPr/>
+        </p:nvSpPr>
+        <p:spPr>
+          <a:xfrm>
+            <a:off x="3223967" y="2910526"/>
+            <a:ext cx="169682" cy="169683"/>
+          </a:xfrm>
+          <a:prstGeom prst="rect">
+            <a:avLst/>
+          </a:prstGeom>
+          <a:noFill/>
+          <a:ln w="9525">
+            <a:solidFill>
+              <a:schemeClr val="tx1"/>
+            </a:solidFill>
+            <a:prstDash val="sysDot"/>
+          </a:ln>
+        </p:spPr>
+        <p:style>
+          <a:lnRef idx="2">
+            <a:schemeClr val="accent1">
+              <a:shade val="50000"/>
+            </a:schemeClr>
+          </a:lnRef>
+          <a:fillRef idx="1">
+            <a:schemeClr val="accent1"/>
+          </a:fillRef>
+          <a:effectRef idx="0">
+            <a:schemeClr val="accent1"/>
+          </a:effectRef>
+          <a:fontRef idx="minor">
+            <a:schemeClr val="lt1"/>
+          </a:fontRef>
+        </p:style>
+        <p:txBody>
+          <a:bodyPr rtlCol="0" anchor="ctr"/>
+          <a:lstStyle/>
+          <a:p>
+            <a:pPr algn="ctr"/>
+            <a:endParaRPr lang="ko-KR" altLang="en-US"/>
+          </a:p>
+        </p:txBody>
+      </p:sp>
+      <p:sp>
+        <p:nvSpPr>
+          <p:cNvPr id="13" name="직사각형 12">
+            <a:extLst>
+              <a:ext uri="{FF2B5EF4-FFF2-40B4-BE49-F238E27FC236}">
+                <a16:creationId xmlns:a16="http://schemas.microsoft.com/office/drawing/2014/main" id="{7B3F35CF-C294-4741-9297-5E01BAD5C875}"/>
+              </a:ext>
+            </a:extLst>
+          </p:cNvPr>
+          <p:cNvSpPr/>
+          <p:nvPr/>
+        </p:nvSpPr>
+        <p:spPr>
+          <a:xfrm>
+            <a:off x="5131735" y="780068"/>
+            <a:ext cx="6213432" cy="5297864"/>
+          </a:xfrm>
+          <a:prstGeom prst="rect">
+            <a:avLst/>
+          </a:prstGeom>
+          <a:noFill/>
+          <a:ln>
+            <a:solidFill>
+              <a:schemeClr val="tx1"/>
+            </a:solidFill>
+            <a:prstDash val="lgDash"/>
+          </a:ln>
+        </p:spPr>
+        <p:style>
+          <a:lnRef idx="2">
+            <a:schemeClr val="accent1">
+              <a:shade val="50000"/>
+            </a:schemeClr>
+          </a:lnRef>
+          <a:fillRef idx="1">
+            <a:schemeClr val="accent1"/>
+          </a:fillRef>
+          <a:effectRef idx="0">
+            <a:schemeClr val="accent1"/>
+          </a:effectRef>
+          <a:fontRef idx="minor">
+            <a:schemeClr val="lt1"/>
+          </a:fontRef>
+        </p:style>
+        <p:txBody>
+          <a:bodyPr rtlCol="0" anchor="ctr"/>
+          <a:lstStyle/>
+          <a:p>
+            <a:pPr algn="ctr"/>
+            <a:endParaRPr lang="ko-KR" altLang="en-US"/>
+          </a:p>
+        </p:txBody>
+      </p:sp>
+      <p:sp>
+        <p:nvSpPr>
+          <p:cNvPr id="22" name="자유형: 도형 21">
+            <a:extLst>
+              <a:ext uri="{FF2B5EF4-FFF2-40B4-BE49-F238E27FC236}">
+                <a16:creationId xmlns:a16="http://schemas.microsoft.com/office/drawing/2014/main" id="{7C94667A-3DF3-44B1-AC49-5F511954AB38}"/>
+              </a:ext>
+            </a:extLst>
+          </p:cNvPr>
+          <p:cNvSpPr/>
+          <p:nvPr/>
+        </p:nvSpPr>
+        <p:spPr>
+          <a:xfrm>
+            <a:off x="6224016" y="1845360"/>
+            <a:ext cx="2508758" cy="3151632"/>
+          </a:xfrm>
+          <a:custGeom>
+            <a:avLst/>
+            <a:gdLst>
+              <a:gd name="connsiteX0" fmla="*/ 0 w 2529840"/>
+              <a:gd name="connsiteY0" fmla="*/ 0 h 3151632"/>
+              <a:gd name="connsiteX1" fmla="*/ 1548384 w 2529840"/>
+              <a:gd name="connsiteY1" fmla="*/ 3151632 h 3151632"/>
+              <a:gd name="connsiteX2" fmla="*/ 2529840 w 2529840"/>
+              <a:gd name="connsiteY2" fmla="*/ 3151632 h 3151632"/>
+              <a:gd name="connsiteX3" fmla="*/ 981456 w 2529840"/>
+              <a:gd name="connsiteY3" fmla="*/ 6096 h 3151632"/>
+            </a:gdLst>
+            <a:ahLst/>
+            <a:cxnLst>
+              <a:cxn ang="0">
+                <a:pos x="connsiteX0" y="connsiteY0"/>
+              </a:cxn>
+              <a:cxn ang="0">
+                <a:pos x="connsiteX1" y="connsiteY1"/>
+              </a:cxn>
+              <a:cxn ang="0">
+                <a:pos x="connsiteX2" y="connsiteY2"/>
+              </a:cxn>
+              <a:cxn ang="0">
+                <a:pos x="connsiteX3" y="connsiteY3"/>
+              </a:cxn>
+            </a:cxnLst>
+            <a:rect l="l" t="t" r="r" b="b"/>
+            <a:pathLst>
+              <a:path w="2529840" h="3151632">
+                <a:moveTo>
+                  <a:pt x="0" y="0"/>
+                </a:moveTo>
+                <a:lnTo>
+                  <a:pt x="1548384" y="3151632"/>
+                </a:lnTo>
+                <a:lnTo>
+                  <a:pt x="2529840" y="3151632"/>
+                </a:lnTo>
+                <a:lnTo>
+                  <a:pt x="981456" y="6096"/>
+                </a:lnTo>
+              </a:path>
+            </a:pathLst>
+          </a:custGeom>
+          <a:pattFill prst="ltHorz">
+            <a:fgClr>
+              <a:schemeClr val="accent1"/>
+            </a:fgClr>
+            <a:bgClr>
+              <a:schemeClr val="bg1"/>
+            </a:bgClr>
+          </a:pattFill>
+          <a:ln>
+            <a:noFill/>
+          </a:ln>
+        </p:spPr>
+        <p:style>
+          <a:lnRef idx="2">
+            <a:schemeClr val="accent1">
+              <a:shade val="50000"/>
+            </a:schemeClr>
+          </a:lnRef>
+          <a:fillRef idx="1">
+            <a:schemeClr val="accent1"/>
+          </a:fillRef>
+          <a:effectRef idx="0">
+            <a:schemeClr val="accent1"/>
+          </a:effectRef>
+          <a:fontRef idx="minor">
+            <a:schemeClr val="lt1"/>
+          </a:fontRef>
+        </p:style>
+        <p:txBody>
+          <a:bodyPr rtlCol="0" anchor="ctr"/>
+          <a:lstStyle/>
+          <a:p>
+            <a:pPr algn="ctr"/>
+            <a:endParaRPr lang="ko-KR" altLang="en-US"/>
+          </a:p>
+        </p:txBody>
+      </p:sp>
+      <p:cxnSp>
+        <p:nvCxnSpPr>
+          <p:cNvPr id="15" name="직선 연결선 14">
+            <a:extLst>
+              <a:ext uri="{FF2B5EF4-FFF2-40B4-BE49-F238E27FC236}">
+                <a16:creationId xmlns:a16="http://schemas.microsoft.com/office/drawing/2014/main" id="{EA01EA86-CEEB-4693-AFDA-975F017BB27A}"/>
+              </a:ext>
+            </a:extLst>
+          </p:cNvPr>
+          <p:cNvCxnSpPr>
+            <a:stCxn id="10" idx="0"/>
+          </p:cNvCxnSpPr>
+          <p:nvPr/>
+        </p:nvCxnSpPr>
+        <p:spPr>
+          <a:xfrm flipV="1">
+            <a:off x="3308808" y="780068"/>
+            <a:ext cx="1822927" cy="2130458"/>
+          </a:xfrm>
+          <a:prstGeom prst="line">
+            <a:avLst/>
+          </a:prstGeom>
+          <a:ln>
+            <a:solidFill>
+              <a:schemeClr val="tx1"/>
+            </a:solidFill>
+            <a:prstDash val="lgDash"/>
+          </a:ln>
+        </p:spPr>
+        <p:style>
+          <a:lnRef idx="1">
+            <a:schemeClr val="accent1"/>
+          </a:lnRef>
+          <a:fillRef idx="0">
+            <a:schemeClr val="accent1"/>
+          </a:fillRef>
+          <a:effectRef idx="0">
+            <a:schemeClr val="accent1"/>
+          </a:effectRef>
+          <a:fontRef idx="minor">
+            <a:schemeClr val="tx1"/>
+          </a:fontRef>
+        </p:style>
+      </p:cxnSp>
+      <p:cxnSp>
+        <p:nvCxnSpPr>
+          <p:cNvPr id="17" name="직선 연결선 16">
+            <a:extLst>
+              <a:ext uri="{FF2B5EF4-FFF2-40B4-BE49-F238E27FC236}">
+                <a16:creationId xmlns:a16="http://schemas.microsoft.com/office/drawing/2014/main" id="{B0E8C3A9-376F-4BBC-858A-11327FCA117A}"/>
+              </a:ext>
+            </a:extLst>
+          </p:cNvPr>
+          <p:cNvCxnSpPr>
+            <a:stCxn id="10" idx="2"/>
+          </p:cNvCxnSpPr>
+          <p:nvPr/>
+        </p:nvCxnSpPr>
+        <p:spPr>
+          <a:xfrm>
+            <a:off x="3308808" y="3080209"/>
+            <a:ext cx="1822927" cy="2997723"/>
+          </a:xfrm>
+          <a:prstGeom prst="line">
+            <a:avLst/>
+          </a:prstGeom>
+          <a:ln>
+            <a:solidFill>
+              <a:schemeClr val="tx1"/>
+            </a:solidFill>
+            <a:prstDash val="lgDash"/>
+          </a:ln>
+        </p:spPr>
+        <p:style>
+          <a:lnRef idx="1">
+            <a:schemeClr val="accent1"/>
+          </a:lnRef>
+          <a:fillRef idx="0">
+            <a:schemeClr val="accent1"/>
+          </a:fillRef>
+          <a:effectRef idx="0">
+            <a:schemeClr val="accent1"/>
+          </a:effectRef>
+          <a:fontRef idx="minor">
+            <a:schemeClr val="tx1"/>
+          </a:fontRef>
+        </p:style>
+      </p:cxnSp>
+      <p:cxnSp>
+        <p:nvCxnSpPr>
+          <p:cNvPr id="19" name="직선 화살표 연결선 18">
+            <a:extLst>
+              <a:ext uri="{FF2B5EF4-FFF2-40B4-BE49-F238E27FC236}">
+                <a16:creationId xmlns:a16="http://schemas.microsoft.com/office/drawing/2014/main" id="{62C0D2C3-B2B5-4741-A80F-8C57228F2451}"/>
+              </a:ext>
+            </a:extLst>
+          </p:cNvPr>
+          <p:cNvCxnSpPr/>
+          <p:nvPr/>
+        </p:nvCxnSpPr>
+        <p:spPr>
+          <a:xfrm>
+            <a:off x="6233317" y="1845297"/>
+            <a:ext cx="952107" cy="0"/>
+          </a:xfrm>
+          <a:prstGeom prst="straightConnector1">
+            <a:avLst/>
+          </a:prstGeom>
+          <a:ln w="57150">
+            <a:tailEnd type="triangle"/>
+          </a:ln>
+        </p:spPr>
+        <p:style>
+          <a:lnRef idx="1">
+            <a:schemeClr val="accent1"/>
+          </a:lnRef>
+          <a:fillRef idx="0">
+            <a:schemeClr val="accent1"/>
+          </a:fillRef>
+          <a:effectRef idx="0">
+            <a:schemeClr val="accent1"/>
+          </a:effectRef>
+          <a:fontRef idx="minor">
+            <a:schemeClr val="tx1"/>
+          </a:fontRef>
+        </p:style>
+      </p:cxnSp>
+      <p:cxnSp>
+        <p:nvCxnSpPr>
+          <p:cNvPr id="20" name="직선 화살표 연결선 19">
+            <a:extLst>
+              <a:ext uri="{FF2B5EF4-FFF2-40B4-BE49-F238E27FC236}">
+                <a16:creationId xmlns:a16="http://schemas.microsoft.com/office/drawing/2014/main" id="{89050BAE-1A87-4E3A-AB79-11B6AA186AAC}"/>
+              </a:ext>
+            </a:extLst>
+          </p:cNvPr>
+          <p:cNvCxnSpPr/>
+          <p:nvPr/>
+        </p:nvCxnSpPr>
+        <p:spPr>
+          <a:xfrm>
+            <a:off x="7780667" y="4993849"/>
+            <a:ext cx="952107" cy="0"/>
+          </a:xfrm>
+          <a:prstGeom prst="straightConnector1">
+            <a:avLst/>
+          </a:prstGeom>
+          <a:ln w="57150">
+            <a:tailEnd type="triangle"/>
+          </a:ln>
+        </p:spPr>
+        <p:style>
+          <a:lnRef idx="1">
+            <a:schemeClr val="accent1"/>
+          </a:lnRef>
+          <a:fillRef idx="0">
+            <a:schemeClr val="accent1"/>
+          </a:fillRef>
+          <a:effectRef idx="0">
+            <a:schemeClr val="accent1"/>
+          </a:effectRef>
+          <a:fontRef idx="minor">
+            <a:schemeClr val="tx1"/>
+          </a:fontRef>
+        </p:style>
+      </p:cxnSp>
+      <p:cxnSp>
+        <p:nvCxnSpPr>
+          <p:cNvPr id="12" name="직선 연결선 11">
+            <a:extLst>
+              <a:ext uri="{FF2B5EF4-FFF2-40B4-BE49-F238E27FC236}">
+                <a16:creationId xmlns:a16="http://schemas.microsoft.com/office/drawing/2014/main" id="{810A4793-39E7-4202-AFC6-FCD81DDFD2BC}"/>
+              </a:ext>
+            </a:extLst>
+          </p:cNvPr>
+          <p:cNvCxnSpPr/>
+          <p:nvPr/>
+        </p:nvCxnSpPr>
+        <p:spPr>
+          <a:xfrm>
+            <a:off x="5978987" y="1352574"/>
+            <a:ext cx="1951349" cy="3978111"/>
+          </a:xfrm>
+          <a:prstGeom prst="line">
+            <a:avLst/>
+          </a:prstGeom>
+          <a:ln w="28575">
+            <a:solidFill>
+              <a:schemeClr val="tx1"/>
+            </a:solidFill>
+          </a:ln>
+        </p:spPr>
+        <p:style>
+          <a:lnRef idx="1">
+            <a:schemeClr val="accent1"/>
+          </a:lnRef>
+          <a:fillRef idx="0">
+            <a:schemeClr val="accent1"/>
+          </a:fillRef>
+          <a:effectRef idx="0">
+            <a:schemeClr val="accent1"/>
+          </a:effectRef>
+          <a:fontRef idx="minor">
+            <a:schemeClr val="tx1"/>
+          </a:fontRef>
+        </p:style>
+      </p:cxnSp>
+      <p:sp>
+        <p:nvSpPr>
+          <p:cNvPr id="23" name="자유형: 도형 22">
+            <a:extLst>
+              <a:ext uri="{FF2B5EF4-FFF2-40B4-BE49-F238E27FC236}">
+                <a16:creationId xmlns:a16="http://schemas.microsoft.com/office/drawing/2014/main" id="{EAD30FD8-68DF-4586-A8A1-453B6BFD7091}"/>
+              </a:ext>
+            </a:extLst>
+          </p:cNvPr>
+          <p:cNvSpPr/>
+          <p:nvPr/>
+        </p:nvSpPr>
+        <p:spPr>
+          <a:xfrm>
+            <a:off x="6207760" y="1857552"/>
+            <a:ext cx="259028" cy="1542907"/>
+          </a:xfrm>
+          <a:custGeom>
+            <a:avLst/>
+            <a:gdLst>
+              <a:gd name="connsiteX0" fmla="*/ 0 w 538480"/>
+              <a:gd name="connsiteY0" fmla="*/ 0 h 2783840"/>
+              <a:gd name="connsiteX1" fmla="*/ 152400 w 538480"/>
+              <a:gd name="connsiteY1" fmla="*/ 1666240 h 2783840"/>
+              <a:gd name="connsiteX2" fmla="*/ 538480 w 538480"/>
+              <a:gd name="connsiteY2" fmla="*/ 2783840 h 2783840"/>
+            </a:gdLst>
+            <a:ahLst/>
+            <a:cxnLst>
+              <a:cxn ang="0">
+                <a:pos x="connsiteX0" y="connsiteY0"/>
+              </a:cxn>
+              <a:cxn ang="0">
+                <a:pos x="connsiteX1" y="connsiteY1"/>
+              </a:cxn>
+              <a:cxn ang="0">
+                <a:pos x="connsiteX2" y="connsiteY2"/>
+              </a:cxn>
+            </a:cxnLst>
+            <a:rect l="l" t="t" r="r" b="b"/>
+            <a:pathLst>
+              <a:path w="538480" h="2783840">
+                <a:moveTo>
+                  <a:pt x="0" y="0"/>
+                </a:moveTo>
+                <a:cubicBezTo>
+                  <a:pt x="31326" y="601133"/>
+                  <a:pt x="62653" y="1202267"/>
+                  <a:pt x="152400" y="1666240"/>
+                </a:cubicBezTo>
+                <a:cubicBezTo>
+                  <a:pt x="242147" y="2130213"/>
+                  <a:pt x="390313" y="2457026"/>
+                  <a:pt x="538480" y="2783840"/>
+                </a:cubicBezTo>
+              </a:path>
+            </a:pathLst>
+          </a:custGeom>
+          <a:noFill/>
+          <a:ln>
+            <a:solidFill>
+              <a:schemeClr val="tx1"/>
+            </a:solidFill>
+            <a:prstDash val="dash"/>
+          </a:ln>
+        </p:spPr>
+        <p:style>
+          <a:lnRef idx="2">
+            <a:schemeClr val="accent1">
+              <a:shade val="50000"/>
+            </a:schemeClr>
+          </a:lnRef>
+          <a:fillRef idx="1">
+            <a:schemeClr val="accent1"/>
+          </a:fillRef>
+          <a:effectRef idx="0">
+            <a:schemeClr val="accent1"/>
+          </a:effectRef>
+          <a:fontRef idx="minor">
+            <a:schemeClr val="lt1"/>
+          </a:fontRef>
+        </p:style>
+        <p:txBody>
+          <a:bodyPr rtlCol="0" anchor="ctr"/>
+          <a:lstStyle/>
+          <a:p>
+            <a:pPr algn="ctr"/>
+            <a:endParaRPr lang="ko-KR" altLang="en-US"/>
+          </a:p>
+        </p:txBody>
+      </p:sp>
+      <p:sp>
+        <p:nvSpPr>
+          <p:cNvPr id="24" name="자유형: 도형 23">
+            <a:extLst>
+              <a:ext uri="{FF2B5EF4-FFF2-40B4-BE49-F238E27FC236}">
+                <a16:creationId xmlns:a16="http://schemas.microsoft.com/office/drawing/2014/main" id="{C6C4DE91-35FA-4DA8-A49E-C2818C279895}"/>
+              </a:ext>
+            </a:extLst>
+          </p:cNvPr>
+          <p:cNvSpPr/>
+          <p:nvPr/>
+        </p:nvSpPr>
+        <p:spPr>
+          <a:xfrm rot="19509709">
+            <a:off x="7110001" y="3660370"/>
+            <a:ext cx="223055" cy="1546072"/>
+          </a:xfrm>
+          <a:custGeom>
+            <a:avLst/>
+            <a:gdLst>
+              <a:gd name="connsiteX0" fmla="*/ 0 w 538480"/>
+              <a:gd name="connsiteY0" fmla="*/ 0 h 2783840"/>
+              <a:gd name="connsiteX1" fmla="*/ 152400 w 538480"/>
+              <a:gd name="connsiteY1" fmla="*/ 1666240 h 2783840"/>
+              <a:gd name="connsiteX2" fmla="*/ 538480 w 538480"/>
+              <a:gd name="connsiteY2" fmla="*/ 2783840 h 2783840"/>
+            </a:gdLst>
+            <a:ahLst/>
+            <a:cxnLst>
+              <a:cxn ang="0">
+                <a:pos x="connsiteX0" y="connsiteY0"/>
+              </a:cxn>
+              <a:cxn ang="0">
+                <a:pos x="connsiteX1" y="connsiteY1"/>
+              </a:cxn>
+              <a:cxn ang="0">
+                <a:pos x="connsiteX2" y="connsiteY2"/>
+              </a:cxn>
+            </a:cxnLst>
+            <a:rect l="l" t="t" r="r" b="b"/>
+            <a:pathLst>
+              <a:path w="538480" h="2783840">
+                <a:moveTo>
+                  <a:pt x="0" y="0"/>
+                </a:moveTo>
+                <a:cubicBezTo>
+                  <a:pt x="31326" y="601133"/>
+                  <a:pt x="62653" y="1202267"/>
+                  <a:pt x="152400" y="1666240"/>
+                </a:cubicBezTo>
+                <a:cubicBezTo>
+                  <a:pt x="242147" y="2130213"/>
+                  <a:pt x="390313" y="2457026"/>
+                  <a:pt x="538480" y="2783840"/>
+                </a:cubicBezTo>
+              </a:path>
+            </a:pathLst>
+          </a:custGeom>
+          <a:noFill/>
+          <a:ln>
+            <a:solidFill>
+              <a:schemeClr val="tx1"/>
+            </a:solidFill>
+            <a:prstDash val="dash"/>
+          </a:ln>
+        </p:spPr>
+        <p:style>
+          <a:lnRef idx="2">
+            <a:schemeClr val="accent1">
+              <a:shade val="50000"/>
+            </a:schemeClr>
+          </a:lnRef>
+          <a:fillRef idx="1">
+            <a:schemeClr val="accent1"/>
+          </a:fillRef>
+          <a:effectRef idx="0">
+            <a:schemeClr val="accent1"/>
+          </a:effectRef>
+          <a:fontRef idx="minor">
+            <a:schemeClr val="lt1"/>
+          </a:fontRef>
+        </p:style>
+        <p:txBody>
+          <a:bodyPr rtlCol="0" anchor="ctr"/>
+          <a:lstStyle/>
+          <a:p>
+            <a:pPr algn="ctr"/>
+            <a:endParaRPr lang="ko-KR" altLang="en-US"/>
+          </a:p>
+        </p:txBody>
+      </p:sp>
+      <mc:AlternateContent xmlns:mc="http://schemas.openxmlformats.org/markup-compatibility/2006" xmlns:a14="http://schemas.microsoft.com/office/drawing/2010/main">
+        <mc:Choice Requires="a14">
+          <p:sp>
+            <p:nvSpPr>
+              <p:cNvPr id="25" name="TextBox 24">
+                <a:extLst>
+                  <a:ext uri="{FF2B5EF4-FFF2-40B4-BE49-F238E27FC236}">
+                    <a16:creationId xmlns:a16="http://schemas.microsoft.com/office/drawing/2014/main" id="{CFF85A8F-D1BF-4123-95AD-8BD72CD0DDE8}"/>
+                  </a:ext>
+                </a:extLst>
+              </p:cNvPr>
+              <p:cNvSpPr txBox="1"/>
+              <p:nvPr/>
+            </p:nvSpPr>
+            <p:spPr>
+              <a:xfrm>
+                <a:off x="6342605" y="3400521"/>
+                <a:ext cx="516423" cy="369332"/>
+              </a:xfrm>
+              <a:prstGeom prst="rect">
+                <a:avLst/>
+              </a:prstGeom>
+              <a:noFill/>
+            </p:spPr>
+            <p:txBody>
+              <a:bodyPr wrap="none" rtlCol="0">
+                <a:spAutoFit/>
+              </a:bodyPr>
+              <a:lstStyle/>
+              <a:p>
+                <a:pPr/>
+                <a14:m>
+                  <m:oMathPara xmlns:m="http://schemas.openxmlformats.org/officeDocument/2006/math">
+                    <m:oMathParaPr>
+                      <m:jc m:val="centerGroup"/>
+                    </m:oMathParaPr>
+                    <m:oMath xmlns:m="http://schemas.openxmlformats.org/officeDocument/2006/math">
+                      <m:r>
+                        <m:rPr>
+                          <m:sty m:val="p"/>
+                        </m:rPr>
+                        <a:rPr lang="en-US" altLang="ko-KR" b="0" i="0" smtClean="0">
+                          <a:latin typeface="Cambria Math" panose="02040503050406030204" pitchFamily="18" charset="0"/>
+                        </a:rPr>
+                        <m:t>Δ</m:t>
+                      </m:r>
+                      <m:r>
+                        <a:rPr lang="en-US" altLang="ko-KR" b="0" i="1" smtClean="0">
+                          <a:latin typeface="Cambria Math" panose="02040503050406030204" pitchFamily="18" charset="0"/>
+                        </a:rPr>
+                        <m:t>𝑠</m:t>
+                      </m:r>
+                    </m:oMath>
+                  </m:oMathPara>
+                </a14:m>
+                <a:endParaRPr lang="ko-KR" altLang="en-US" dirty="0"/>
+              </a:p>
+            </p:txBody>
+          </p:sp>
+        </mc:Choice>
+        <mc:Fallback xmlns="">
+          <p:sp>
+            <p:nvSpPr>
+              <p:cNvPr id="25" name="TextBox 24">
+                <a:extLst>
+                  <a:ext uri="{FF2B5EF4-FFF2-40B4-BE49-F238E27FC236}">
+                    <a16:creationId xmlns:a16="http://schemas.microsoft.com/office/drawing/2014/main" id="{CFF85A8F-D1BF-4123-95AD-8BD72CD0DDE8}"/>
+                  </a:ext>
+                </a:extLst>
+              </p:cNvPr>
+              <p:cNvSpPr txBox="1">
+                <a:spLocks noRot="1" noChangeAspect="1" noMove="1" noResize="1" noEditPoints="1" noAdjustHandles="1" noChangeArrowheads="1" noChangeShapeType="1" noTextEdit="1"/>
+              </p:cNvSpPr>
+              <p:nvPr/>
+            </p:nvSpPr>
+            <p:spPr>
+              <a:xfrm>
+                <a:off x="6342605" y="3400521"/>
+                <a:ext cx="516423" cy="369332"/>
+              </a:xfrm>
+              <a:prstGeom prst="rect">
+                <a:avLst/>
+              </a:prstGeom>
+              <a:blipFill>
+                <a:blip r:embed="rId3"/>
+                <a:stretch>
+                  <a:fillRect/>
+                </a:stretch>
+              </a:blipFill>
+            </p:spPr>
+            <p:txBody>
+              <a:bodyPr/>
+              <a:lstStyle/>
+              <a:p>
+                <a:r>
+                  <a:rPr lang="ko-KR" altLang="en-US">
+                    <a:noFill/>
+                  </a:rPr>
+                  <a:t> </a:t>
+                </a:r>
+              </a:p>
+            </p:txBody>
+          </p:sp>
+        </mc:Fallback>
+      </mc:AlternateContent>
+      <mc:AlternateContent xmlns:mc="http://schemas.openxmlformats.org/markup-compatibility/2006" xmlns:a14="http://schemas.microsoft.com/office/drawing/2010/main">
+        <mc:Choice Requires="a14">
+          <p:sp>
+            <p:nvSpPr>
+              <p:cNvPr id="26" name="TextBox 25">
+                <a:extLst>
+                  <a:ext uri="{FF2B5EF4-FFF2-40B4-BE49-F238E27FC236}">
+                    <a16:creationId xmlns:a16="http://schemas.microsoft.com/office/drawing/2014/main" id="{D0644AAF-6103-4AB4-81FB-BD5F1B4AC87F}"/>
+                  </a:ext>
+                </a:extLst>
+              </p:cNvPr>
+              <p:cNvSpPr txBox="1"/>
+              <p:nvPr/>
+            </p:nvSpPr>
+            <p:spPr>
+              <a:xfrm>
+                <a:off x="6376074" y="1455556"/>
+                <a:ext cx="633058" cy="369332"/>
+              </a:xfrm>
+              <a:prstGeom prst="rect">
+                <a:avLst/>
+              </a:prstGeom>
+              <a:noFill/>
+            </p:spPr>
+            <p:txBody>
+              <a:bodyPr wrap="none" rtlCol="0">
+                <a:spAutoFit/>
+              </a:bodyPr>
+              <a:lstStyle/>
+              <a:p>
+                <a:pPr/>
+                <a14:m>
+                  <m:oMathPara xmlns:m="http://schemas.openxmlformats.org/officeDocument/2006/math">
+                    <m:oMathParaPr>
+                      <m:jc m:val="centerGroup"/>
+                    </m:oMathParaPr>
+                    <m:oMath xmlns:m="http://schemas.openxmlformats.org/officeDocument/2006/math">
+                      <m:acc>
+                        <m:accPr>
+                          <m:chr m:val="⃗"/>
+                          <m:ctrlPr>
+                            <a:rPr lang="en-US" altLang="ko-KR" b="0" i="1" smtClean="0">
+                              <a:latin typeface="Cambria Math" panose="02040503050406030204" pitchFamily="18" charset="0"/>
+                            </a:rPr>
+                          </m:ctrlPr>
+                        </m:accPr>
+                        <m:e>
+                          <m:r>
+                            <a:rPr lang="en-US" altLang="ko-KR" b="0" i="1" smtClean="0">
+                              <a:latin typeface="Cambria Math" panose="02040503050406030204" pitchFamily="18" charset="0"/>
+                            </a:rPr>
+                            <m:t>𝑣</m:t>
+                          </m:r>
+                        </m:e>
+                      </m:acc>
+                      <m:r>
+                        <m:rPr>
+                          <m:sty m:val="p"/>
+                        </m:rPr>
+                        <a:rPr lang="en-US" altLang="ko-KR" b="0" i="0" smtClean="0">
+                          <a:latin typeface="Cambria Math" panose="02040503050406030204" pitchFamily="18" charset="0"/>
+                        </a:rPr>
+                        <m:t>Δ</m:t>
+                      </m:r>
+                      <m:r>
+                        <a:rPr lang="en-US" altLang="ko-KR" b="0" i="1" smtClean="0">
+                          <a:latin typeface="Cambria Math" panose="02040503050406030204" pitchFamily="18" charset="0"/>
+                        </a:rPr>
+                        <m:t>𝑡</m:t>
+                      </m:r>
+                    </m:oMath>
+                  </m:oMathPara>
+                </a14:m>
+                <a:endParaRPr lang="ko-KR" altLang="en-US" dirty="0"/>
+              </a:p>
+            </p:txBody>
+          </p:sp>
+        </mc:Choice>
+        <mc:Fallback xmlns="">
+          <p:sp>
+            <p:nvSpPr>
+              <p:cNvPr id="26" name="TextBox 25">
+                <a:extLst>
+                  <a:ext uri="{FF2B5EF4-FFF2-40B4-BE49-F238E27FC236}">
+                    <a16:creationId xmlns:a16="http://schemas.microsoft.com/office/drawing/2014/main" id="{D0644AAF-6103-4AB4-81FB-BD5F1B4AC87F}"/>
+                  </a:ext>
+                </a:extLst>
+              </p:cNvPr>
+              <p:cNvSpPr txBox="1">
+                <a:spLocks noRot="1" noChangeAspect="1" noMove="1" noResize="1" noEditPoints="1" noAdjustHandles="1" noChangeArrowheads="1" noChangeShapeType="1" noTextEdit="1"/>
+              </p:cNvSpPr>
+              <p:nvPr/>
+            </p:nvSpPr>
+            <p:spPr>
+              <a:xfrm>
+                <a:off x="6376074" y="1455556"/>
+                <a:ext cx="633058" cy="369332"/>
+              </a:xfrm>
+              <a:prstGeom prst="rect">
+                <a:avLst/>
+              </a:prstGeom>
+              <a:blipFill>
+                <a:blip r:embed="rId4"/>
+                <a:stretch>
+                  <a:fillRect t="-20000" r="-962"/>
+                </a:stretch>
+              </a:blipFill>
+            </p:spPr>
+            <p:txBody>
+              <a:bodyPr/>
+              <a:lstStyle/>
+              <a:p>
+                <a:r>
+                  <a:rPr lang="ko-KR" altLang="en-US">
+                    <a:noFill/>
+                  </a:rPr>
+                  <a:t> </a:t>
+                </a:r>
+              </a:p>
+            </p:txBody>
+          </p:sp>
+        </mc:Fallback>
+      </mc:AlternateContent>
+      <mc:AlternateContent xmlns:mc="http://schemas.openxmlformats.org/markup-compatibility/2006" xmlns:a14="http://schemas.microsoft.com/office/drawing/2010/main">
+        <mc:Choice Requires="a14">
+          <p:sp>
+            <p:nvSpPr>
+              <p:cNvPr id="27" name="TextBox 26">
+                <a:extLst>
+                  <a:ext uri="{FF2B5EF4-FFF2-40B4-BE49-F238E27FC236}">
+                    <a16:creationId xmlns:a16="http://schemas.microsoft.com/office/drawing/2014/main" id="{CA5EB64E-4C38-4F48-B165-B3C735996DE4}"/>
+                  </a:ext>
+                </a:extLst>
+              </p:cNvPr>
+              <p:cNvSpPr txBox="1"/>
+              <p:nvPr/>
+            </p:nvSpPr>
+            <p:spPr>
+              <a:xfrm>
+                <a:off x="7940191" y="4990707"/>
+                <a:ext cx="633058" cy="369332"/>
+              </a:xfrm>
+              <a:prstGeom prst="rect">
+                <a:avLst/>
+              </a:prstGeom>
+              <a:noFill/>
+            </p:spPr>
+            <p:txBody>
+              <a:bodyPr wrap="none" rtlCol="0">
+                <a:spAutoFit/>
+              </a:bodyPr>
+              <a:lstStyle/>
+              <a:p>
+                <a:pPr/>
+                <a14:m>
+                  <m:oMathPara xmlns:m="http://schemas.openxmlformats.org/officeDocument/2006/math">
+                    <m:oMathParaPr>
+                      <m:jc m:val="centerGroup"/>
+                    </m:oMathParaPr>
+                    <m:oMath xmlns:m="http://schemas.openxmlformats.org/officeDocument/2006/math">
+                      <m:acc>
+                        <m:accPr>
+                          <m:chr m:val="⃗"/>
+                          <m:ctrlPr>
+                            <a:rPr lang="en-US" altLang="ko-KR" b="0" i="1" smtClean="0">
+                              <a:latin typeface="Cambria Math" panose="02040503050406030204" pitchFamily="18" charset="0"/>
+                            </a:rPr>
+                          </m:ctrlPr>
+                        </m:accPr>
+                        <m:e>
+                          <m:r>
+                            <a:rPr lang="en-US" altLang="ko-KR" b="0" i="1" smtClean="0">
+                              <a:latin typeface="Cambria Math" panose="02040503050406030204" pitchFamily="18" charset="0"/>
+                            </a:rPr>
+                            <m:t>𝑣</m:t>
+                          </m:r>
+                        </m:e>
+                      </m:acc>
+                      <m:r>
+                        <m:rPr>
+                          <m:sty m:val="p"/>
+                        </m:rPr>
+                        <a:rPr lang="en-US" altLang="ko-KR" b="0" i="0" smtClean="0">
+                          <a:latin typeface="Cambria Math" panose="02040503050406030204" pitchFamily="18" charset="0"/>
+                        </a:rPr>
+                        <m:t>Δ</m:t>
+                      </m:r>
+                      <m:r>
+                        <a:rPr lang="en-US" altLang="ko-KR" b="0" i="1" smtClean="0">
+                          <a:latin typeface="Cambria Math" panose="02040503050406030204" pitchFamily="18" charset="0"/>
+                        </a:rPr>
+                        <m:t>𝑡</m:t>
+                      </m:r>
+                    </m:oMath>
+                  </m:oMathPara>
+                </a14:m>
+                <a:endParaRPr lang="ko-KR" altLang="en-US" dirty="0"/>
+              </a:p>
+            </p:txBody>
+          </p:sp>
+        </mc:Choice>
+        <mc:Fallback xmlns="">
+          <p:sp>
+            <p:nvSpPr>
+              <p:cNvPr id="27" name="TextBox 26">
+                <a:extLst>
+                  <a:ext uri="{FF2B5EF4-FFF2-40B4-BE49-F238E27FC236}">
+                    <a16:creationId xmlns:a16="http://schemas.microsoft.com/office/drawing/2014/main" id="{CA5EB64E-4C38-4F48-B165-B3C735996DE4}"/>
+                  </a:ext>
+                </a:extLst>
+              </p:cNvPr>
+              <p:cNvSpPr txBox="1">
+                <a:spLocks noRot="1" noChangeAspect="1" noMove="1" noResize="1" noEditPoints="1" noAdjustHandles="1" noChangeArrowheads="1" noChangeShapeType="1" noTextEdit="1"/>
+              </p:cNvSpPr>
+              <p:nvPr/>
+            </p:nvSpPr>
+            <p:spPr>
+              <a:xfrm>
+                <a:off x="7940191" y="4990707"/>
+                <a:ext cx="633058" cy="369332"/>
+              </a:xfrm>
+              <a:prstGeom prst="rect">
+                <a:avLst/>
+              </a:prstGeom>
+              <a:blipFill>
+                <a:blip r:embed="rId5"/>
+                <a:stretch>
+                  <a:fillRect t="-20000" r="-1942"/>
+                </a:stretch>
+              </a:blipFill>
+            </p:spPr>
+            <p:txBody>
+              <a:bodyPr/>
+              <a:lstStyle/>
+              <a:p>
+                <a:r>
+                  <a:rPr lang="ko-KR" altLang="en-US">
+                    <a:noFill/>
+                  </a:rPr>
+                  <a:t> </a:t>
+                </a:r>
+              </a:p>
+            </p:txBody>
+          </p:sp>
+        </mc:Fallback>
+      </mc:AlternateContent>
+      <p:sp>
+        <p:nvSpPr>
+          <p:cNvPr id="28" name="TextBox 27">
+            <a:extLst>
+              <a:ext uri="{FF2B5EF4-FFF2-40B4-BE49-F238E27FC236}">
+                <a16:creationId xmlns:a16="http://schemas.microsoft.com/office/drawing/2014/main" id="{6D576695-B063-4506-B51E-1F1A1D0FF618}"/>
+              </a:ext>
+            </a:extLst>
+          </p:cNvPr>
+          <p:cNvSpPr txBox="1"/>
+          <p:nvPr/>
+        </p:nvSpPr>
+        <p:spPr>
+          <a:xfrm>
+            <a:off x="7776699" y="2782669"/>
+            <a:ext cx="3005887" cy="646331"/>
+          </a:xfrm>
+          <a:prstGeom prst="rect">
+            <a:avLst/>
+          </a:prstGeom>
+          <a:noFill/>
+        </p:spPr>
+        <p:txBody>
+          <a:bodyPr wrap="none" rtlCol="0">
+            <a:spAutoFit/>
+          </a:bodyPr>
+          <a:lstStyle/>
+          <a:p>
+            <a:pPr algn="r"/>
+            <a:r>
+              <a:rPr lang="en-US" altLang="ko-KR" dirty="0"/>
+              <a:t>Flux of infinitesimal path= </a:t>
+            </a:r>
+          </a:p>
+          <a:p>
+            <a:pPr algn="r"/>
+            <a:r>
+              <a:rPr lang="en-US" altLang="ko-KR" dirty="0"/>
+              <a:t>Area of parallelogram</a:t>
+            </a:r>
+            <a:endParaRPr lang="ko-KR" altLang="en-US" dirty="0"/>
+          </a:p>
+        </p:txBody>
+      </p:sp>
+      <p:sp>
+        <p:nvSpPr>
+          <p:cNvPr id="31" name="TextBox 30">
+            <a:extLst>
+              <a:ext uri="{FF2B5EF4-FFF2-40B4-BE49-F238E27FC236}">
+                <a16:creationId xmlns:a16="http://schemas.microsoft.com/office/drawing/2014/main" id="{6D190599-C7F4-4461-9672-B32AA1B6656A}"/>
+              </a:ext>
+            </a:extLst>
+          </p:cNvPr>
+          <p:cNvSpPr txBox="1"/>
+          <p:nvPr/>
+        </p:nvSpPr>
+        <p:spPr>
+          <a:xfrm>
+            <a:off x="5216576" y="874336"/>
+            <a:ext cx="6213432" cy="369332"/>
+          </a:xfrm>
+          <a:prstGeom prst="rect">
+            <a:avLst/>
+          </a:prstGeom>
+          <a:noFill/>
+        </p:spPr>
+        <p:txBody>
+          <a:bodyPr wrap="none" rtlCol="0">
+            <a:spAutoFit/>
+          </a:bodyPr>
+          <a:lstStyle/>
+          <a:p>
+            <a:r>
+              <a:rPr lang="en-US" altLang="ko-KR" dirty="0"/>
+              <a:t>&lt;Zoomed in on the flux path of the infinitesimal region&gt;</a:t>
+            </a:r>
+            <a:endParaRPr lang="ko-KR" altLang="en-US" dirty="0"/>
+          </a:p>
+        </p:txBody>
+      </p:sp>
+    </p:spTree>
+    <p:extLst>
+      <p:ext uri="{BB962C8B-B14F-4D97-AF65-F5344CB8AC3E}">
+        <p14:creationId xmlns:p14="http://schemas.microsoft.com/office/powerpoint/2010/main" val="2353017901"/>
+      </p:ext>
+    </p:extLst>
+  </p:cSld>
+  <p:clrMapOvr>
+    <a:masterClrMapping/>
+  </p:clrMapOvr>
+</p:sld>
+</file>
+
+<file path=ppt/slides/slide5.xml><?xml version="1.0" encoding="utf-8"?>
+<p:sld xmlns:a="http://schemas.openxmlformats.org/drawingml/2006/main" xmlns:r="http://schemas.openxmlformats.org/officeDocument/2006/relationships" xmlns:p="http://schemas.openxmlformats.org/presentationml/2006/main">
+  <p:cSld>
+    <p:spTree>
+      <p:nvGrpSpPr>
+        <p:cNvPr id="1" name=""/>
+        <p:cNvGrpSpPr/>
+        <p:nvPr/>
+      </p:nvGrpSpPr>
+      <p:grpSpPr>
+        <a:xfrm>
+          <a:off x="0" y="0"/>
+          <a:ext cx="0" cy="0"/>
+          <a:chOff x="0" y="0"/>
+          <a:chExt cx="0" cy="0"/>
+        </a:xfrm>
+      </p:grpSpPr>
       <p:sp>
         <p:nvSpPr>
           <p:cNvPr id="22" name="자유형: 도형 21">
@@ -5634,8 +6875,8 @@
           </a:p>
         </p:txBody>
       </p:sp>
-      <mc:AlternateContent xmlns:mc="http://schemas.openxmlformats.org/markup-compatibility/2006">
-        <mc:Choice xmlns:a14="http://schemas.microsoft.com/office/drawing/2010/main" Requires="a14">
+      <mc:AlternateContent xmlns:mc="http://schemas.openxmlformats.org/markup-compatibility/2006" xmlns:a14="http://schemas.microsoft.com/office/drawing/2010/main">
+        <mc:Choice Requires="a14">
           <p:sp>
             <p:nvSpPr>
               <p:cNvPr id="25" name="TextBox 24">
@@ -5694,7 +6935,7 @@
             </p:txBody>
           </p:sp>
         </mc:Choice>
-        <mc:Fallback>
+        <mc:Fallback xmlns="">
           <p:sp>
             <p:nvSpPr>
               <p:cNvPr id="25" name="TextBox 24">
@@ -5739,8 +6980,8 @@
           </p:sp>
         </mc:Fallback>
       </mc:AlternateContent>
-      <mc:AlternateContent xmlns:mc="http://schemas.openxmlformats.org/markup-compatibility/2006">
-        <mc:Choice xmlns:a14="http://schemas.microsoft.com/office/drawing/2010/main" Requires="a14">
+      <mc:AlternateContent xmlns:mc="http://schemas.openxmlformats.org/markup-compatibility/2006" xmlns:a14="http://schemas.microsoft.com/office/drawing/2010/main">
+        <mc:Choice Requires="a14">
           <p:sp>
             <p:nvSpPr>
               <p:cNvPr id="26" name="TextBox 25">
@@ -5833,7 +7074,7 @@
             </p:txBody>
           </p:sp>
         </mc:Choice>
-        <mc:Fallback>
+        <mc:Fallback xmlns="">
           <p:sp>
             <p:nvSpPr>
               <p:cNvPr id="26" name="TextBox 25">
@@ -6089,7 +7330,6 @@
               </a:bodyPr>
               <a:lstStyle/>
               <a:p>
-                <a:pPr/>
                 <a14:m>
                   <m:oMath xmlns:m="http://schemas.openxmlformats.org/officeDocument/2006/math">
                     <m:acc>
@@ -6198,7 +7438,7 @@
               <a:lstStyle/>
               <a:p>
                 <a:r>
-                  <a:rPr lang="ko-KR" altLang="en-US">
+                  <a:rPr lang="en-US">
                     <a:noFill/>
                   </a:rPr>
                   <a:t> </a:t>
@@ -6238,7 +7478,6 @@
               </a:bodyPr>
               <a:lstStyle/>
               <a:p>
-                <a:pPr/>
                 <a14:m>
                   <m:oMath xmlns:m="http://schemas.openxmlformats.org/officeDocument/2006/math">
                     <m:acc>
@@ -6347,7 +7586,7 @@
               <a:lstStyle/>
               <a:p>
                 <a:r>
-                  <a:rPr lang="ko-KR" altLang="en-US">
+                  <a:rPr lang="en-US">
                     <a:noFill/>
                   </a:rPr>
                   <a:t> </a:t>
@@ -6370,7 +7609,1143 @@
 </p:sld>
 </file>
 
-<file path=ppt/slides/slide5.xml><?xml version="1.0" encoding="utf-8"?>
+<file path=ppt/slides/slide6.xml><?xml version="1.0" encoding="utf-8"?>
+<p:sld xmlns:a="http://schemas.openxmlformats.org/drawingml/2006/main" xmlns:r="http://schemas.openxmlformats.org/officeDocument/2006/relationships" xmlns:p="http://schemas.openxmlformats.org/presentationml/2006/main">
+  <p:cSld>
+    <p:spTree>
+      <p:nvGrpSpPr>
+        <p:cNvPr id="1" name=""/>
+        <p:cNvGrpSpPr/>
+        <p:nvPr/>
+      </p:nvGrpSpPr>
+      <p:grpSpPr>
+        <a:xfrm>
+          <a:off x="0" y="0"/>
+          <a:ext cx="0" cy="0"/>
+          <a:chOff x="0" y="0"/>
+          <a:chExt cx="0" cy="0"/>
+        </a:xfrm>
+      </p:grpSpPr>
+      <p:sp>
+        <p:nvSpPr>
+          <p:cNvPr id="22" name="자유형: 도형 21">
+            <a:extLst>
+              <a:ext uri="{FF2B5EF4-FFF2-40B4-BE49-F238E27FC236}">
+                <a16:creationId xmlns:a16="http://schemas.microsoft.com/office/drawing/2014/main" id="{7C94667A-3DF3-44B1-AC49-5F511954AB38}"/>
+              </a:ext>
+            </a:extLst>
+          </p:cNvPr>
+          <p:cNvSpPr/>
+          <p:nvPr/>
+        </p:nvSpPr>
+        <p:spPr>
+          <a:xfrm>
+            <a:off x="3933302" y="1845360"/>
+            <a:ext cx="2508758" cy="3151632"/>
+          </a:xfrm>
+          <a:custGeom>
+            <a:avLst/>
+            <a:gdLst>
+              <a:gd name="connsiteX0" fmla="*/ 0 w 2529840"/>
+              <a:gd name="connsiteY0" fmla="*/ 0 h 3151632"/>
+              <a:gd name="connsiteX1" fmla="*/ 1548384 w 2529840"/>
+              <a:gd name="connsiteY1" fmla="*/ 3151632 h 3151632"/>
+              <a:gd name="connsiteX2" fmla="*/ 2529840 w 2529840"/>
+              <a:gd name="connsiteY2" fmla="*/ 3151632 h 3151632"/>
+              <a:gd name="connsiteX3" fmla="*/ 981456 w 2529840"/>
+              <a:gd name="connsiteY3" fmla="*/ 6096 h 3151632"/>
+            </a:gdLst>
+            <a:ahLst/>
+            <a:cxnLst>
+              <a:cxn ang="0">
+                <a:pos x="connsiteX0" y="connsiteY0"/>
+              </a:cxn>
+              <a:cxn ang="0">
+                <a:pos x="connsiteX1" y="connsiteY1"/>
+              </a:cxn>
+              <a:cxn ang="0">
+                <a:pos x="connsiteX2" y="connsiteY2"/>
+              </a:cxn>
+              <a:cxn ang="0">
+                <a:pos x="connsiteX3" y="connsiteY3"/>
+              </a:cxn>
+            </a:cxnLst>
+            <a:rect l="l" t="t" r="r" b="b"/>
+            <a:pathLst>
+              <a:path w="2529840" h="3151632">
+                <a:moveTo>
+                  <a:pt x="0" y="0"/>
+                </a:moveTo>
+                <a:lnTo>
+                  <a:pt x="1548384" y="3151632"/>
+                </a:lnTo>
+                <a:lnTo>
+                  <a:pt x="2529840" y="3151632"/>
+                </a:lnTo>
+                <a:lnTo>
+                  <a:pt x="981456" y="6096"/>
+                </a:lnTo>
+              </a:path>
+            </a:pathLst>
+          </a:custGeom>
+          <a:pattFill prst="ltHorz">
+            <a:fgClr>
+              <a:schemeClr val="accent1"/>
+            </a:fgClr>
+            <a:bgClr>
+              <a:schemeClr val="bg1"/>
+            </a:bgClr>
+          </a:pattFill>
+          <a:ln>
+            <a:noFill/>
+          </a:ln>
+        </p:spPr>
+        <p:style>
+          <a:lnRef idx="2">
+            <a:schemeClr val="accent1">
+              <a:shade val="50000"/>
+            </a:schemeClr>
+          </a:lnRef>
+          <a:fillRef idx="1">
+            <a:schemeClr val="accent1"/>
+          </a:fillRef>
+          <a:effectRef idx="0">
+            <a:schemeClr val="accent1"/>
+          </a:effectRef>
+          <a:fontRef idx="minor">
+            <a:schemeClr val="lt1"/>
+          </a:fontRef>
+        </p:style>
+        <p:txBody>
+          <a:bodyPr rtlCol="0" anchor="ctr"/>
+          <a:lstStyle/>
+          <a:p>
+            <a:pPr algn="ctr"/>
+            <a:endParaRPr lang="ko-KR" altLang="en-US"/>
+          </a:p>
+        </p:txBody>
+      </p:sp>
+      <p:cxnSp>
+        <p:nvCxnSpPr>
+          <p:cNvPr id="19" name="직선 화살표 연결선 18">
+            <a:extLst>
+              <a:ext uri="{FF2B5EF4-FFF2-40B4-BE49-F238E27FC236}">
+                <a16:creationId xmlns:a16="http://schemas.microsoft.com/office/drawing/2014/main" id="{62C0D2C3-B2B5-4741-A80F-8C57228F2451}"/>
+              </a:ext>
+            </a:extLst>
+          </p:cNvPr>
+          <p:cNvCxnSpPr/>
+          <p:nvPr/>
+        </p:nvCxnSpPr>
+        <p:spPr>
+          <a:xfrm>
+            <a:off x="3942603" y="1845297"/>
+            <a:ext cx="952107" cy="0"/>
+          </a:xfrm>
+          <a:prstGeom prst="straightConnector1">
+            <a:avLst/>
+          </a:prstGeom>
+          <a:ln w="57150">
+            <a:tailEnd type="triangle"/>
+          </a:ln>
+        </p:spPr>
+        <p:style>
+          <a:lnRef idx="1">
+            <a:schemeClr val="accent1"/>
+          </a:lnRef>
+          <a:fillRef idx="0">
+            <a:schemeClr val="accent1"/>
+          </a:fillRef>
+          <a:effectRef idx="0">
+            <a:schemeClr val="accent1"/>
+          </a:effectRef>
+          <a:fontRef idx="minor">
+            <a:schemeClr val="tx1"/>
+          </a:fontRef>
+        </p:style>
+      </p:cxnSp>
+      <p:cxnSp>
+        <p:nvCxnSpPr>
+          <p:cNvPr id="20" name="직선 화살표 연결선 19">
+            <a:extLst>
+              <a:ext uri="{FF2B5EF4-FFF2-40B4-BE49-F238E27FC236}">
+                <a16:creationId xmlns:a16="http://schemas.microsoft.com/office/drawing/2014/main" id="{89050BAE-1A87-4E3A-AB79-11B6AA186AAC}"/>
+              </a:ext>
+            </a:extLst>
+          </p:cNvPr>
+          <p:cNvCxnSpPr/>
+          <p:nvPr/>
+        </p:nvCxnSpPr>
+        <p:spPr>
+          <a:xfrm>
+            <a:off x="5489953" y="4993849"/>
+            <a:ext cx="952107" cy="0"/>
+          </a:xfrm>
+          <a:prstGeom prst="straightConnector1">
+            <a:avLst/>
+          </a:prstGeom>
+          <a:ln w="57150">
+            <a:tailEnd type="triangle"/>
+          </a:ln>
+        </p:spPr>
+        <p:style>
+          <a:lnRef idx="1">
+            <a:schemeClr val="accent1"/>
+          </a:lnRef>
+          <a:fillRef idx="0">
+            <a:schemeClr val="accent1"/>
+          </a:fillRef>
+          <a:effectRef idx="0">
+            <a:schemeClr val="accent1"/>
+          </a:effectRef>
+          <a:fontRef idx="minor">
+            <a:schemeClr val="tx1"/>
+          </a:fontRef>
+        </p:style>
+      </p:cxnSp>
+      <p:cxnSp>
+        <p:nvCxnSpPr>
+          <p:cNvPr id="12" name="직선 연결선 11">
+            <a:extLst>
+              <a:ext uri="{FF2B5EF4-FFF2-40B4-BE49-F238E27FC236}">
+                <a16:creationId xmlns:a16="http://schemas.microsoft.com/office/drawing/2014/main" id="{810A4793-39E7-4202-AFC6-FCD81DDFD2BC}"/>
+              </a:ext>
+            </a:extLst>
+          </p:cNvPr>
+          <p:cNvCxnSpPr>
+            <a:cxnSpLocks/>
+          </p:cNvCxnSpPr>
+          <p:nvPr/>
+        </p:nvCxnSpPr>
+        <p:spPr>
+          <a:xfrm>
+            <a:off x="3688273" y="1352574"/>
+            <a:ext cx="2146919" cy="4376809"/>
+          </a:xfrm>
+          <a:prstGeom prst="line">
+            <a:avLst/>
+          </a:prstGeom>
+          <a:ln w="28575">
+            <a:solidFill>
+              <a:schemeClr val="tx1"/>
+            </a:solidFill>
+          </a:ln>
+        </p:spPr>
+        <p:style>
+          <a:lnRef idx="1">
+            <a:schemeClr val="accent1"/>
+          </a:lnRef>
+          <a:fillRef idx="0">
+            <a:schemeClr val="accent1"/>
+          </a:fillRef>
+          <a:effectRef idx="0">
+            <a:schemeClr val="accent1"/>
+          </a:effectRef>
+          <a:fontRef idx="minor">
+            <a:schemeClr val="tx1"/>
+          </a:fontRef>
+        </p:style>
+      </p:cxnSp>
+      <p:sp>
+        <p:nvSpPr>
+          <p:cNvPr id="23" name="자유형: 도형 22">
+            <a:extLst>
+              <a:ext uri="{FF2B5EF4-FFF2-40B4-BE49-F238E27FC236}">
+                <a16:creationId xmlns:a16="http://schemas.microsoft.com/office/drawing/2014/main" id="{EAD30FD8-68DF-4586-A8A1-453B6BFD7091}"/>
+              </a:ext>
+            </a:extLst>
+          </p:cNvPr>
+          <p:cNvSpPr/>
+          <p:nvPr/>
+        </p:nvSpPr>
+        <p:spPr>
+          <a:xfrm>
+            <a:off x="3917046" y="1857552"/>
+            <a:ext cx="259028" cy="1542907"/>
+          </a:xfrm>
+          <a:custGeom>
+            <a:avLst/>
+            <a:gdLst>
+              <a:gd name="connsiteX0" fmla="*/ 0 w 538480"/>
+              <a:gd name="connsiteY0" fmla="*/ 0 h 2783840"/>
+              <a:gd name="connsiteX1" fmla="*/ 152400 w 538480"/>
+              <a:gd name="connsiteY1" fmla="*/ 1666240 h 2783840"/>
+              <a:gd name="connsiteX2" fmla="*/ 538480 w 538480"/>
+              <a:gd name="connsiteY2" fmla="*/ 2783840 h 2783840"/>
+            </a:gdLst>
+            <a:ahLst/>
+            <a:cxnLst>
+              <a:cxn ang="0">
+                <a:pos x="connsiteX0" y="connsiteY0"/>
+              </a:cxn>
+              <a:cxn ang="0">
+                <a:pos x="connsiteX1" y="connsiteY1"/>
+              </a:cxn>
+              <a:cxn ang="0">
+                <a:pos x="connsiteX2" y="connsiteY2"/>
+              </a:cxn>
+            </a:cxnLst>
+            <a:rect l="l" t="t" r="r" b="b"/>
+            <a:pathLst>
+              <a:path w="538480" h="2783840">
+                <a:moveTo>
+                  <a:pt x="0" y="0"/>
+                </a:moveTo>
+                <a:cubicBezTo>
+                  <a:pt x="31326" y="601133"/>
+                  <a:pt x="62653" y="1202267"/>
+                  <a:pt x="152400" y="1666240"/>
+                </a:cubicBezTo>
+                <a:cubicBezTo>
+                  <a:pt x="242147" y="2130213"/>
+                  <a:pt x="390313" y="2457026"/>
+                  <a:pt x="538480" y="2783840"/>
+                </a:cubicBezTo>
+              </a:path>
+            </a:pathLst>
+          </a:custGeom>
+          <a:noFill/>
+          <a:ln>
+            <a:solidFill>
+              <a:schemeClr val="tx1"/>
+            </a:solidFill>
+            <a:prstDash val="dash"/>
+          </a:ln>
+        </p:spPr>
+        <p:style>
+          <a:lnRef idx="2">
+            <a:schemeClr val="accent1">
+              <a:shade val="50000"/>
+            </a:schemeClr>
+          </a:lnRef>
+          <a:fillRef idx="1">
+            <a:schemeClr val="accent1"/>
+          </a:fillRef>
+          <a:effectRef idx="0">
+            <a:schemeClr val="accent1"/>
+          </a:effectRef>
+          <a:fontRef idx="minor">
+            <a:schemeClr val="lt1"/>
+          </a:fontRef>
+        </p:style>
+        <p:txBody>
+          <a:bodyPr rtlCol="0" anchor="ctr"/>
+          <a:lstStyle/>
+          <a:p>
+            <a:pPr algn="ctr"/>
+            <a:endParaRPr lang="ko-KR" altLang="en-US"/>
+          </a:p>
+        </p:txBody>
+      </p:sp>
+      <p:sp>
+        <p:nvSpPr>
+          <p:cNvPr id="24" name="자유형: 도형 23">
+            <a:extLst>
+              <a:ext uri="{FF2B5EF4-FFF2-40B4-BE49-F238E27FC236}">
+                <a16:creationId xmlns:a16="http://schemas.microsoft.com/office/drawing/2014/main" id="{C6C4DE91-35FA-4DA8-A49E-C2818C279895}"/>
+              </a:ext>
+            </a:extLst>
+          </p:cNvPr>
+          <p:cNvSpPr/>
+          <p:nvPr/>
+        </p:nvSpPr>
+        <p:spPr>
+          <a:xfrm rot="19509709">
+            <a:off x="4819287" y="3660370"/>
+            <a:ext cx="223055" cy="1546072"/>
+          </a:xfrm>
+          <a:custGeom>
+            <a:avLst/>
+            <a:gdLst>
+              <a:gd name="connsiteX0" fmla="*/ 0 w 538480"/>
+              <a:gd name="connsiteY0" fmla="*/ 0 h 2783840"/>
+              <a:gd name="connsiteX1" fmla="*/ 152400 w 538480"/>
+              <a:gd name="connsiteY1" fmla="*/ 1666240 h 2783840"/>
+              <a:gd name="connsiteX2" fmla="*/ 538480 w 538480"/>
+              <a:gd name="connsiteY2" fmla="*/ 2783840 h 2783840"/>
+            </a:gdLst>
+            <a:ahLst/>
+            <a:cxnLst>
+              <a:cxn ang="0">
+                <a:pos x="connsiteX0" y="connsiteY0"/>
+              </a:cxn>
+              <a:cxn ang="0">
+                <a:pos x="connsiteX1" y="connsiteY1"/>
+              </a:cxn>
+              <a:cxn ang="0">
+                <a:pos x="connsiteX2" y="connsiteY2"/>
+              </a:cxn>
+            </a:cxnLst>
+            <a:rect l="l" t="t" r="r" b="b"/>
+            <a:pathLst>
+              <a:path w="538480" h="2783840">
+                <a:moveTo>
+                  <a:pt x="0" y="0"/>
+                </a:moveTo>
+                <a:cubicBezTo>
+                  <a:pt x="31326" y="601133"/>
+                  <a:pt x="62653" y="1202267"/>
+                  <a:pt x="152400" y="1666240"/>
+                </a:cubicBezTo>
+                <a:cubicBezTo>
+                  <a:pt x="242147" y="2130213"/>
+                  <a:pt x="390313" y="2457026"/>
+                  <a:pt x="538480" y="2783840"/>
+                </a:cubicBezTo>
+              </a:path>
+            </a:pathLst>
+          </a:custGeom>
+          <a:noFill/>
+          <a:ln>
+            <a:solidFill>
+              <a:schemeClr val="tx1"/>
+            </a:solidFill>
+            <a:prstDash val="dash"/>
+          </a:ln>
+        </p:spPr>
+        <p:style>
+          <a:lnRef idx="2">
+            <a:schemeClr val="accent1">
+              <a:shade val="50000"/>
+            </a:schemeClr>
+          </a:lnRef>
+          <a:fillRef idx="1">
+            <a:schemeClr val="accent1"/>
+          </a:fillRef>
+          <a:effectRef idx="0">
+            <a:schemeClr val="accent1"/>
+          </a:effectRef>
+          <a:fontRef idx="minor">
+            <a:schemeClr val="lt1"/>
+          </a:fontRef>
+        </p:style>
+        <p:txBody>
+          <a:bodyPr rtlCol="0" anchor="ctr"/>
+          <a:lstStyle/>
+          <a:p>
+            <a:pPr algn="ctr"/>
+            <a:endParaRPr lang="ko-KR" altLang="en-US"/>
+          </a:p>
+        </p:txBody>
+      </p:sp>
+      <mc:AlternateContent xmlns:mc="http://schemas.openxmlformats.org/markup-compatibility/2006" xmlns:a14="http://schemas.microsoft.com/office/drawing/2010/main">
+        <mc:Choice Requires="a14">
+          <p:sp>
+            <p:nvSpPr>
+              <p:cNvPr id="25" name="TextBox 24">
+                <a:extLst>
+                  <a:ext uri="{FF2B5EF4-FFF2-40B4-BE49-F238E27FC236}">
+                    <a16:creationId xmlns:a16="http://schemas.microsoft.com/office/drawing/2014/main" id="{CFF85A8F-D1BF-4123-95AD-8BD72CD0DDE8}"/>
+                  </a:ext>
+                </a:extLst>
+              </p:cNvPr>
+              <p:cNvSpPr txBox="1"/>
+              <p:nvPr/>
+            </p:nvSpPr>
+            <p:spPr>
+              <a:xfrm>
+                <a:off x="4051891" y="3400521"/>
+                <a:ext cx="516423" cy="369332"/>
+              </a:xfrm>
+              <a:prstGeom prst="rect">
+                <a:avLst/>
+              </a:prstGeom>
+              <a:noFill/>
+            </p:spPr>
+            <p:txBody>
+              <a:bodyPr wrap="none" rtlCol="0">
+                <a:spAutoFit/>
+              </a:bodyPr>
+              <a:lstStyle/>
+              <a:p>
+                <a:pPr/>
+                <a14:m>
+                  <m:oMathPara xmlns:m="http://schemas.openxmlformats.org/officeDocument/2006/math">
+                    <m:oMathParaPr>
+                      <m:jc m:val="centerGroup"/>
+                    </m:oMathParaPr>
+                    <m:oMath xmlns:m="http://schemas.openxmlformats.org/officeDocument/2006/math">
+                      <m:r>
+                        <m:rPr>
+                          <m:sty m:val="p"/>
+                        </m:rPr>
+                        <a:rPr lang="en-US" altLang="ko-KR" b="0" i="0" smtClean="0">
+                          <a:latin typeface="Cambria Math" panose="02040503050406030204" pitchFamily="18" charset="0"/>
+                        </a:rPr>
+                        <m:t>Δ</m:t>
+                      </m:r>
+                      <m:r>
+                        <a:rPr lang="en-US" altLang="ko-KR" b="0" i="1" smtClean="0">
+                          <a:latin typeface="Cambria Math" panose="02040503050406030204" pitchFamily="18" charset="0"/>
+                        </a:rPr>
+                        <m:t>𝑠</m:t>
+                      </m:r>
+                    </m:oMath>
+                  </m:oMathPara>
+                </a14:m>
+                <a:endParaRPr lang="ko-KR" altLang="en-US" dirty="0"/>
+              </a:p>
+            </p:txBody>
+          </p:sp>
+        </mc:Choice>
+        <mc:Fallback xmlns="">
+          <p:sp>
+            <p:nvSpPr>
+              <p:cNvPr id="25" name="TextBox 24">
+                <a:extLst>
+                  <a:ext uri="{FF2B5EF4-FFF2-40B4-BE49-F238E27FC236}">
+                    <a16:creationId xmlns:a16="http://schemas.microsoft.com/office/drawing/2014/main" id="{CFF85A8F-D1BF-4123-95AD-8BD72CD0DDE8}"/>
+                  </a:ext>
+                </a:extLst>
+              </p:cNvPr>
+              <p:cNvSpPr txBox="1">
+                <a:spLocks noRot="1" noChangeAspect="1" noMove="1" noResize="1" noEditPoints="1" noAdjustHandles="1" noChangeArrowheads="1" noChangeShapeType="1" noTextEdit="1"/>
+              </p:cNvSpPr>
+              <p:nvPr/>
+            </p:nvSpPr>
+            <p:spPr>
+              <a:xfrm>
+                <a:off x="4051891" y="3400521"/>
+                <a:ext cx="516423" cy="369332"/>
+              </a:xfrm>
+              <a:prstGeom prst="rect">
+                <a:avLst/>
+              </a:prstGeom>
+              <a:blipFill>
+                <a:blip r:embed="rId2"/>
+                <a:stretch>
+                  <a:fillRect/>
+                </a:stretch>
+              </a:blipFill>
+            </p:spPr>
+            <p:txBody>
+              <a:bodyPr/>
+              <a:lstStyle/>
+              <a:p>
+                <a:r>
+                  <a:rPr lang="ko-KR" altLang="en-US">
+                    <a:noFill/>
+                  </a:rPr>
+                  <a:t> </a:t>
+                </a:r>
+              </a:p>
+            </p:txBody>
+          </p:sp>
+        </mc:Fallback>
+      </mc:AlternateContent>
+      <mc:AlternateContent xmlns:mc="http://schemas.openxmlformats.org/markup-compatibility/2006" xmlns:a14="http://schemas.microsoft.com/office/drawing/2010/main">
+        <mc:Choice Requires="a14">
+          <p:sp>
+            <p:nvSpPr>
+              <p:cNvPr id="26" name="TextBox 25">
+                <a:extLst>
+                  <a:ext uri="{FF2B5EF4-FFF2-40B4-BE49-F238E27FC236}">
+                    <a16:creationId xmlns:a16="http://schemas.microsoft.com/office/drawing/2014/main" id="{D0644AAF-6103-4AB4-81FB-BD5F1B4AC87F}"/>
+                  </a:ext>
+                </a:extLst>
+              </p:cNvPr>
+              <p:cNvSpPr txBox="1"/>
+              <p:nvPr/>
+            </p:nvSpPr>
+            <p:spPr>
+              <a:xfrm>
+                <a:off x="4085360" y="1455556"/>
+                <a:ext cx="633058" cy="369332"/>
+              </a:xfrm>
+              <a:prstGeom prst="rect">
+                <a:avLst/>
+              </a:prstGeom>
+              <a:noFill/>
+            </p:spPr>
+            <p:txBody>
+              <a:bodyPr wrap="none" rtlCol="0">
+                <a:spAutoFit/>
+              </a:bodyPr>
+              <a:lstStyle/>
+              <a:p>
+                <a:pPr/>
+                <a14:m>
+                  <m:oMathPara xmlns:m="http://schemas.openxmlformats.org/officeDocument/2006/math">
+                    <m:oMathParaPr>
+                      <m:jc m:val="centerGroup"/>
+                    </m:oMathParaPr>
+                    <m:oMath xmlns:m="http://schemas.openxmlformats.org/officeDocument/2006/math">
+                      <m:acc>
+                        <m:accPr>
+                          <m:chr m:val="⃗"/>
+                          <m:ctrlPr>
+                            <a:rPr lang="en-US" altLang="ko-KR" b="0" i="1" smtClean="0">
+                              <a:solidFill>
+                                <a:schemeClr val="accent1"/>
+                              </a:solidFill>
+                              <a:latin typeface="Cambria Math" panose="02040503050406030204" pitchFamily="18" charset="0"/>
+                            </a:rPr>
+                          </m:ctrlPr>
+                        </m:accPr>
+                        <m:e>
+                          <m:r>
+                            <a:rPr lang="en-US" altLang="ko-KR" b="0" i="1" smtClean="0">
+                              <a:solidFill>
+                                <a:schemeClr val="accent1"/>
+                              </a:solidFill>
+                              <a:latin typeface="Cambria Math" panose="02040503050406030204" pitchFamily="18" charset="0"/>
+                            </a:rPr>
+                            <m:t>𝑣</m:t>
+                          </m:r>
+                        </m:e>
+                      </m:acc>
+                      <m:r>
+                        <m:rPr>
+                          <m:sty m:val="p"/>
+                        </m:rPr>
+                        <a:rPr lang="en-US" altLang="ko-KR" b="0" i="0" smtClean="0">
+                          <a:solidFill>
+                            <a:schemeClr val="accent1"/>
+                          </a:solidFill>
+                          <a:latin typeface="Cambria Math" panose="02040503050406030204" pitchFamily="18" charset="0"/>
+                        </a:rPr>
+                        <m:t>Δ</m:t>
+                      </m:r>
+                      <m:r>
+                        <a:rPr lang="en-US" altLang="ko-KR" b="0" i="1" smtClean="0">
+                          <a:solidFill>
+                            <a:schemeClr val="accent1"/>
+                          </a:solidFill>
+                          <a:latin typeface="Cambria Math" panose="02040503050406030204" pitchFamily="18" charset="0"/>
+                        </a:rPr>
+                        <m:t>𝑡</m:t>
+                      </m:r>
+                    </m:oMath>
+                  </m:oMathPara>
+                </a14:m>
+                <a:endParaRPr lang="ko-KR" altLang="en-US" dirty="0">
+                  <a:solidFill>
+                    <a:schemeClr val="accent1"/>
+                  </a:solidFill>
+                </a:endParaRPr>
+              </a:p>
+            </p:txBody>
+          </p:sp>
+        </mc:Choice>
+        <mc:Fallback xmlns="">
+          <p:sp>
+            <p:nvSpPr>
+              <p:cNvPr id="26" name="TextBox 25">
+                <a:extLst>
+                  <a:ext uri="{FF2B5EF4-FFF2-40B4-BE49-F238E27FC236}">
+                    <a16:creationId xmlns:a16="http://schemas.microsoft.com/office/drawing/2014/main" id="{D0644AAF-6103-4AB4-81FB-BD5F1B4AC87F}"/>
+                  </a:ext>
+                </a:extLst>
+              </p:cNvPr>
+              <p:cNvSpPr txBox="1">
+                <a:spLocks noRot="1" noChangeAspect="1" noMove="1" noResize="1" noEditPoints="1" noAdjustHandles="1" noChangeArrowheads="1" noChangeShapeType="1" noTextEdit="1"/>
+              </p:cNvSpPr>
+              <p:nvPr/>
+            </p:nvSpPr>
+            <p:spPr>
+              <a:xfrm>
+                <a:off x="4085360" y="1455556"/>
+                <a:ext cx="633058" cy="369332"/>
+              </a:xfrm>
+              <a:prstGeom prst="rect">
+                <a:avLst/>
+              </a:prstGeom>
+              <a:blipFill>
+                <a:blip r:embed="rId3"/>
+                <a:stretch>
+                  <a:fillRect t="-20000" r="-1923"/>
+                </a:stretch>
+              </a:blipFill>
+            </p:spPr>
+            <p:txBody>
+              <a:bodyPr/>
+              <a:lstStyle/>
+              <a:p>
+                <a:r>
+                  <a:rPr lang="ko-KR" altLang="en-US">
+                    <a:noFill/>
+                  </a:rPr>
+                  <a:t> </a:t>
+                </a:r>
+              </a:p>
+            </p:txBody>
+          </p:sp>
+        </mc:Fallback>
+      </mc:AlternateContent>
+      <p:sp>
+        <p:nvSpPr>
+          <p:cNvPr id="28" name="TextBox 27">
+            <a:extLst>
+              <a:ext uri="{FF2B5EF4-FFF2-40B4-BE49-F238E27FC236}">
+                <a16:creationId xmlns:a16="http://schemas.microsoft.com/office/drawing/2014/main" id="{6D576695-B063-4506-B51E-1F1A1D0FF618}"/>
+              </a:ext>
+            </a:extLst>
+          </p:cNvPr>
+          <p:cNvSpPr txBox="1"/>
+          <p:nvPr/>
+        </p:nvSpPr>
+        <p:spPr>
+          <a:xfrm>
+            <a:off x="5562084" y="2782669"/>
+            <a:ext cx="3005887" cy="646331"/>
+          </a:xfrm>
+          <a:prstGeom prst="rect">
+            <a:avLst/>
+          </a:prstGeom>
+          <a:noFill/>
+        </p:spPr>
+        <p:txBody>
+          <a:bodyPr wrap="none" rtlCol="0">
+            <a:spAutoFit/>
+          </a:bodyPr>
+          <a:lstStyle/>
+          <a:p>
+            <a:pPr algn="r"/>
+            <a:r>
+              <a:rPr lang="en-US" altLang="ko-KR" dirty="0"/>
+              <a:t>Flux of infinitesimal path= </a:t>
+            </a:r>
+          </a:p>
+          <a:p>
+            <a:pPr algn="r"/>
+            <a:r>
+              <a:rPr lang="en-US" altLang="ko-KR" dirty="0"/>
+              <a:t>Area of parallelogram</a:t>
+            </a:r>
+            <a:endParaRPr lang="ko-KR" altLang="en-US" dirty="0"/>
+          </a:p>
+        </p:txBody>
+      </p:sp>
+      <p:sp>
+        <p:nvSpPr>
+          <p:cNvPr id="31" name="TextBox 30">
+            <a:extLst>
+              <a:ext uri="{FF2B5EF4-FFF2-40B4-BE49-F238E27FC236}">
+                <a16:creationId xmlns:a16="http://schemas.microsoft.com/office/drawing/2014/main" id="{6D190599-C7F4-4461-9672-B32AA1B6656A}"/>
+              </a:ext>
+            </a:extLst>
+          </p:cNvPr>
+          <p:cNvSpPr txBox="1"/>
+          <p:nvPr/>
+        </p:nvSpPr>
+        <p:spPr>
+          <a:xfrm>
+            <a:off x="4045313" y="874336"/>
+            <a:ext cx="3149837" cy="369332"/>
+          </a:xfrm>
+          <a:prstGeom prst="rect">
+            <a:avLst/>
+          </a:prstGeom>
+          <a:noFill/>
+        </p:spPr>
+        <p:txBody>
+          <a:bodyPr wrap="none" rtlCol="0">
+            <a:spAutoFit/>
+          </a:bodyPr>
+          <a:lstStyle/>
+          <a:p>
+            <a:r>
+              <a:rPr lang="en-US" altLang="ko-KR" dirty="0"/>
+              <a:t>&lt;Flux on infinitesimal path&gt;</a:t>
+            </a:r>
+            <a:endParaRPr lang="ko-KR" altLang="en-US" dirty="0"/>
+          </a:p>
+        </p:txBody>
+      </p:sp>
+      <p:cxnSp>
+        <p:nvCxnSpPr>
+          <p:cNvPr id="21" name="직선 연결선 20">
+            <a:extLst>
+              <a:ext uri="{FF2B5EF4-FFF2-40B4-BE49-F238E27FC236}">
+                <a16:creationId xmlns:a16="http://schemas.microsoft.com/office/drawing/2014/main" id="{313B1AB5-0A54-4EF0-A59F-7760E54F3781}"/>
+              </a:ext>
+            </a:extLst>
+          </p:cNvPr>
+          <p:cNvCxnSpPr>
+            <a:cxnSpLocks/>
+          </p:cNvCxnSpPr>
+          <p:nvPr/>
+        </p:nvCxnSpPr>
+        <p:spPr>
+          <a:xfrm flipV="1">
+            <a:off x="4153061" y="1653966"/>
+            <a:ext cx="1251415" cy="613847"/>
+          </a:xfrm>
+          <a:prstGeom prst="line">
+            <a:avLst/>
+          </a:prstGeom>
+          <a:ln w="57150">
+            <a:solidFill>
+              <a:srgbClr val="FF0000"/>
+            </a:solidFill>
+            <a:headEnd type="none" w="med" len="med"/>
+            <a:tailEnd type="arrow" w="med" len="med"/>
+          </a:ln>
+        </p:spPr>
+        <p:style>
+          <a:lnRef idx="1">
+            <a:schemeClr val="accent1"/>
+          </a:lnRef>
+          <a:fillRef idx="0">
+            <a:schemeClr val="accent1"/>
+          </a:fillRef>
+          <a:effectRef idx="0">
+            <a:schemeClr val="accent1"/>
+          </a:effectRef>
+          <a:fontRef idx="minor">
+            <a:schemeClr val="tx1"/>
+          </a:fontRef>
+        </p:style>
+      </p:cxnSp>
+      <p:cxnSp>
+        <p:nvCxnSpPr>
+          <p:cNvPr id="29" name="직선 연결선 28">
+            <a:extLst>
+              <a:ext uri="{FF2B5EF4-FFF2-40B4-BE49-F238E27FC236}">
+                <a16:creationId xmlns:a16="http://schemas.microsoft.com/office/drawing/2014/main" id="{EFBAAA11-38E8-412D-BC39-9E39789FDF42}"/>
+              </a:ext>
+            </a:extLst>
+          </p:cNvPr>
+          <p:cNvCxnSpPr>
+            <a:cxnSpLocks/>
+          </p:cNvCxnSpPr>
+          <p:nvPr/>
+        </p:nvCxnSpPr>
+        <p:spPr>
+          <a:xfrm flipV="1">
+            <a:off x="5695129" y="4794801"/>
+            <a:ext cx="1251415" cy="613847"/>
+          </a:xfrm>
+          <a:prstGeom prst="line">
+            <a:avLst/>
+          </a:prstGeom>
+          <a:ln w="57150">
+            <a:solidFill>
+              <a:srgbClr val="FF0000"/>
+            </a:solidFill>
+            <a:headEnd type="none" w="med" len="med"/>
+            <a:tailEnd type="arrow" w="med" len="med"/>
+          </a:ln>
+        </p:spPr>
+        <p:style>
+          <a:lnRef idx="1">
+            <a:schemeClr val="accent1"/>
+          </a:lnRef>
+          <a:fillRef idx="0">
+            <a:schemeClr val="accent1"/>
+          </a:fillRef>
+          <a:effectRef idx="0">
+            <a:schemeClr val="accent1"/>
+          </a:effectRef>
+          <a:fontRef idx="minor">
+            <a:schemeClr val="tx1"/>
+          </a:fontRef>
+        </p:style>
+      </p:cxnSp>
+      <mc:AlternateContent xmlns:mc="http://schemas.openxmlformats.org/markup-compatibility/2006">
+        <mc:Choice xmlns:a14="http://schemas.microsoft.com/office/drawing/2010/main" Requires="a14">
+          <p:sp>
+            <p:nvSpPr>
+              <p:cNvPr id="30" name="TextBox 29">
+                <a:extLst>
+                  <a:ext uri="{FF2B5EF4-FFF2-40B4-BE49-F238E27FC236}">
+                    <a16:creationId xmlns:a16="http://schemas.microsoft.com/office/drawing/2014/main" id="{7ED92556-D679-4798-BF36-82138AAA4830}"/>
+                  </a:ext>
+                </a:extLst>
+              </p:cNvPr>
+              <p:cNvSpPr txBox="1"/>
+              <p:nvPr/>
+            </p:nvSpPr>
+            <p:spPr>
+              <a:xfrm>
+                <a:off x="5073894" y="1271689"/>
+                <a:ext cx="2607637" cy="369332"/>
+              </a:xfrm>
+              <a:prstGeom prst="rect">
+                <a:avLst/>
+              </a:prstGeom>
+              <a:noFill/>
+            </p:spPr>
+            <p:txBody>
+              <a:bodyPr wrap="none" rtlCol="0">
+                <a:spAutoFit/>
+              </a:bodyPr>
+              <a:lstStyle/>
+              <a:p>
+                <a14:m>
+                  <m:oMath xmlns:m="http://schemas.openxmlformats.org/officeDocument/2006/math">
+                    <m:acc>
+                      <m:accPr>
+                        <m:chr m:val="̂"/>
+                        <m:ctrlPr>
+                          <a:rPr lang="en-US" altLang="ko-KR" b="0" i="1" smtClean="0">
+                            <a:solidFill>
+                              <a:srgbClr val="FF0000"/>
+                            </a:solidFill>
+                            <a:latin typeface="Cambria Math" panose="02040503050406030204" pitchFamily="18" charset="0"/>
+                          </a:rPr>
+                        </m:ctrlPr>
+                      </m:accPr>
+                      <m:e>
+                        <m:r>
+                          <a:rPr lang="en-US" altLang="ko-KR" b="0" i="1" smtClean="0">
+                            <a:solidFill>
+                              <a:srgbClr val="FF0000"/>
+                            </a:solidFill>
+                            <a:latin typeface="Cambria Math" panose="02040503050406030204" pitchFamily="18" charset="0"/>
+                          </a:rPr>
+                          <m:t>𝑛</m:t>
+                        </m:r>
+                      </m:e>
+                    </m:acc>
+                  </m:oMath>
+                </a14:m>
+                <a:r>
+                  <a:rPr lang="en-US" altLang="ko-KR" dirty="0">
+                    <a:solidFill>
+                      <a:srgbClr val="FF0000"/>
+                    </a:solidFill>
+                  </a:rPr>
+                  <a:t>: tangent vector of </a:t>
+                </a:r>
+                <a14:m>
+                  <m:oMath xmlns:m="http://schemas.openxmlformats.org/officeDocument/2006/math">
+                    <m:r>
+                      <m:rPr>
+                        <m:sty m:val="p"/>
+                      </m:rPr>
+                      <a:rPr lang="en-US" altLang="ko-KR" b="0" i="0" smtClean="0">
+                        <a:solidFill>
+                          <a:srgbClr val="FF0000"/>
+                        </a:solidFill>
+                        <a:latin typeface="Cambria Math" panose="02040503050406030204" pitchFamily="18" charset="0"/>
+                      </a:rPr>
+                      <m:t>Δ</m:t>
+                    </m:r>
+                    <m:r>
+                      <a:rPr lang="en-US" altLang="ko-KR" b="0" i="1" smtClean="0">
+                        <a:solidFill>
+                          <a:srgbClr val="FF0000"/>
+                        </a:solidFill>
+                        <a:latin typeface="Cambria Math" panose="02040503050406030204" pitchFamily="18" charset="0"/>
+                      </a:rPr>
+                      <m:t>𝑠</m:t>
+                    </m:r>
+                  </m:oMath>
+                </a14:m>
+                <a:endParaRPr lang="ko-KR" altLang="en-US" dirty="0">
+                  <a:solidFill>
+                    <a:srgbClr val="FF0000"/>
+                  </a:solidFill>
+                </a:endParaRPr>
+              </a:p>
+            </p:txBody>
+          </p:sp>
+        </mc:Choice>
+        <mc:Fallback>
+          <p:sp>
+            <p:nvSpPr>
+              <p:cNvPr id="30" name="TextBox 29">
+                <a:extLst>
+                  <a:ext uri="{FF2B5EF4-FFF2-40B4-BE49-F238E27FC236}">
+                    <a16:creationId xmlns:a16="http://schemas.microsoft.com/office/drawing/2014/main" id="{7ED92556-D679-4798-BF36-82138AAA4830}"/>
+                  </a:ext>
+                </a:extLst>
+              </p:cNvPr>
+              <p:cNvSpPr txBox="1">
+                <a:spLocks noRot="1" noChangeAspect="1" noMove="1" noResize="1" noEditPoints="1" noAdjustHandles="1" noChangeArrowheads="1" noChangeShapeType="1" noTextEdit="1"/>
+              </p:cNvSpPr>
+              <p:nvPr/>
+            </p:nvSpPr>
+            <p:spPr>
+              <a:xfrm>
+                <a:off x="5073894" y="1271689"/>
+                <a:ext cx="2607637" cy="369332"/>
+              </a:xfrm>
+              <a:prstGeom prst="rect">
+                <a:avLst/>
+              </a:prstGeom>
+              <a:blipFill>
+                <a:blip r:embed="rId4"/>
+                <a:stretch>
+                  <a:fillRect t="-10000" b="-26667"/>
+                </a:stretch>
+              </a:blipFill>
+            </p:spPr>
+            <p:txBody>
+              <a:bodyPr/>
+              <a:lstStyle/>
+              <a:p>
+                <a:r>
+                  <a:rPr lang="en-US">
+                    <a:noFill/>
+                  </a:rPr>
+                  <a:t> </a:t>
+                </a:r>
+              </a:p>
+            </p:txBody>
+          </p:sp>
+        </mc:Fallback>
+      </mc:AlternateContent>
+      <mc:AlternateContent xmlns:mc="http://schemas.openxmlformats.org/markup-compatibility/2006">
+        <mc:Choice xmlns:a14="http://schemas.microsoft.com/office/drawing/2010/main" Requires="a14">
+          <p:sp>
+            <p:nvSpPr>
+              <p:cNvPr id="32" name="TextBox 31">
+                <a:extLst>
+                  <a:ext uri="{FF2B5EF4-FFF2-40B4-BE49-F238E27FC236}">
+                    <a16:creationId xmlns:a16="http://schemas.microsoft.com/office/drawing/2014/main" id="{2692EBA7-0A10-4C9C-87C8-8FE61502EA8D}"/>
+                  </a:ext>
+                </a:extLst>
+              </p:cNvPr>
+              <p:cNvSpPr txBox="1"/>
+              <p:nvPr/>
+            </p:nvSpPr>
+            <p:spPr>
+              <a:xfrm>
+                <a:off x="6458316" y="4385982"/>
+                <a:ext cx="2607637" cy="369332"/>
+              </a:xfrm>
+              <a:prstGeom prst="rect">
+                <a:avLst/>
+              </a:prstGeom>
+              <a:noFill/>
+            </p:spPr>
+            <p:txBody>
+              <a:bodyPr wrap="none" rtlCol="0">
+                <a:spAutoFit/>
+              </a:bodyPr>
+              <a:lstStyle/>
+              <a:p>
+                <a14:m>
+                  <m:oMath xmlns:m="http://schemas.openxmlformats.org/officeDocument/2006/math">
+                    <m:acc>
+                      <m:accPr>
+                        <m:chr m:val="̂"/>
+                        <m:ctrlPr>
+                          <a:rPr lang="en-US" altLang="ko-KR" i="1">
+                            <a:solidFill>
+                              <a:srgbClr val="FF0000"/>
+                            </a:solidFill>
+                            <a:latin typeface="Cambria Math" panose="02040503050406030204" pitchFamily="18" charset="0"/>
+                          </a:rPr>
+                        </m:ctrlPr>
+                      </m:accPr>
+                      <m:e>
+                        <m:r>
+                          <a:rPr lang="en-US" altLang="ko-KR" i="1">
+                            <a:solidFill>
+                              <a:srgbClr val="FF0000"/>
+                            </a:solidFill>
+                            <a:latin typeface="Cambria Math" panose="02040503050406030204" pitchFamily="18" charset="0"/>
+                          </a:rPr>
+                          <m:t>𝑛</m:t>
+                        </m:r>
+                      </m:e>
+                    </m:acc>
+                  </m:oMath>
+                </a14:m>
+                <a:r>
+                  <a:rPr lang="en-US" altLang="ko-KR" dirty="0">
+                    <a:solidFill>
+                      <a:srgbClr val="FF0000"/>
+                    </a:solidFill>
+                  </a:rPr>
+                  <a:t>: tangent vector of </a:t>
+                </a:r>
+                <a14:m>
+                  <m:oMath xmlns:m="http://schemas.openxmlformats.org/officeDocument/2006/math">
+                    <m:r>
+                      <m:rPr>
+                        <m:sty m:val="p"/>
+                      </m:rPr>
+                      <a:rPr lang="en-US" altLang="ko-KR">
+                        <a:solidFill>
+                          <a:srgbClr val="FF0000"/>
+                        </a:solidFill>
+                        <a:latin typeface="Cambria Math" panose="02040503050406030204" pitchFamily="18" charset="0"/>
+                      </a:rPr>
+                      <m:t>Δ</m:t>
+                    </m:r>
+                    <m:r>
+                      <a:rPr lang="en-US" altLang="ko-KR" i="1">
+                        <a:solidFill>
+                          <a:srgbClr val="FF0000"/>
+                        </a:solidFill>
+                        <a:latin typeface="Cambria Math" panose="02040503050406030204" pitchFamily="18" charset="0"/>
+                      </a:rPr>
+                      <m:t>𝑠</m:t>
+                    </m:r>
+                  </m:oMath>
+                </a14:m>
+                <a:endParaRPr lang="ko-KR" altLang="en-US" dirty="0">
+                  <a:solidFill>
+                    <a:srgbClr val="FF0000"/>
+                  </a:solidFill>
+                </a:endParaRPr>
+              </a:p>
+            </p:txBody>
+          </p:sp>
+        </mc:Choice>
+        <mc:Fallback>
+          <p:sp>
+            <p:nvSpPr>
+              <p:cNvPr id="32" name="TextBox 31">
+                <a:extLst>
+                  <a:ext uri="{FF2B5EF4-FFF2-40B4-BE49-F238E27FC236}">
+                    <a16:creationId xmlns:a16="http://schemas.microsoft.com/office/drawing/2014/main" id="{2692EBA7-0A10-4C9C-87C8-8FE61502EA8D}"/>
+                  </a:ext>
+                </a:extLst>
+              </p:cNvPr>
+              <p:cNvSpPr txBox="1">
+                <a:spLocks noRot="1" noChangeAspect="1" noMove="1" noResize="1" noEditPoints="1" noAdjustHandles="1" noChangeArrowheads="1" noChangeShapeType="1" noTextEdit="1"/>
+              </p:cNvSpPr>
+              <p:nvPr/>
+            </p:nvSpPr>
+            <p:spPr>
+              <a:xfrm>
+                <a:off x="6458316" y="4385982"/>
+                <a:ext cx="2607637" cy="369332"/>
+              </a:xfrm>
+              <a:prstGeom prst="rect">
+                <a:avLst/>
+              </a:prstGeom>
+              <a:blipFill>
+                <a:blip r:embed="rId5"/>
+                <a:stretch>
+                  <a:fillRect t="-8197" b="-24590"/>
+                </a:stretch>
+              </a:blipFill>
+            </p:spPr>
+            <p:txBody>
+              <a:bodyPr/>
+              <a:lstStyle/>
+              <a:p>
+                <a:r>
+                  <a:rPr lang="en-US">
+                    <a:noFill/>
+                  </a:rPr>
+                  <a:t> </a:t>
+                </a:r>
+              </a:p>
+            </p:txBody>
+          </p:sp>
+        </mc:Fallback>
+      </mc:AlternateContent>
+    </p:spTree>
+    <p:extLst>
+      <p:ext uri="{BB962C8B-B14F-4D97-AF65-F5344CB8AC3E}">
+        <p14:creationId xmlns:p14="http://schemas.microsoft.com/office/powerpoint/2010/main" val="1337241682"/>
+      </p:ext>
+    </p:extLst>
+  </p:cSld>
+  <p:clrMapOvr>
+    <a:masterClrMapping/>
+  </p:clrMapOvr>
+</p:sld>
+</file>
+
+<file path=ppt/slides/slide7.xml><?xml version="1.0" encoding="utf-8"?>
 <p:sld xmlns:a="http://schemas.openxmlformats.org/drawingml/2006/main" xmlns:r="http://schemas.openxmlformats.org/officeDocument/2006/relationships" xmlns:p="http://schemas.openxmlformats.org/presentationml/2006/main">
   <p:cSld>
     <p:spTree>
@@ -6478,8 +8853,8 @@
           </a:p>
         </p:txBody>
       </p:sp>
-      <mc:AlternateContent xmlns:mc="http://schemas.openxmlformats.org/markup-compatibility/2006">
-        <mc:Choice xmlns:a14="http://schemas.microsoft.com/office/drawing/2010/main" Requires="a14">
+      <mc:AlternateContent xmlns:mc="http://schemas.openxmlformats.org/markup-compatibility/2006" xmlns:a14="http://schemas.microsoft.com/office/drawing/2010/main">
+        <mc:Choice Requires="a14">
           <p:sp>
             <p:nvSpPr>
               <p:cNvPr id="7" name="TextBox 6">
@@ -6508,6 +8883,7 @@
               </a:bodyPr>
               <a:lstStyle/>
               <a:p>
+                <a:pPr/>
                 <a14:m>
                   <m:oMathPara xmlns:m="http://schemas.openxmlformats.org/officeDocument/2006/math">
                     <m:oMathParaPr>
@@ -6558,7 +8934,7 @@
             </p:txBody>
           </p:sp>
         </mc:Choice>
-        <mc:Fallback>
+        <mc:Fallback xmlns="">
           <p:sp>
             <p:nvSpPr>
               <p:cNvPr id="7" name="TextBox 6">
@@ -6603,8 +8979,8 @@
           </p:sp>
         </mc:Fallback>
       </mc:AlternateContent>
-      <mc:AlternateContent xmlns:mc="http://schemas.openxmlformats.org/markup-compatibility/2006">
-        <mc:Choice xmlns:a14="http://schemas.microsoft.com/office/drawing/2010/main" Requires="a14">
+      <mc:AlternateContent xmlns:mc="http://schemas.openxmlformats.org/markup-compatibility/2006" xmlns:a14="http://schemas.microsoft.com/office/drawing/2010/main">
+        <mc:Choice Requires="a14">
           <p:sp>
             <p:nvSpPr>
               <p:cNvPr id="8" name="TextBox 7">
@@ -6633,6 +9009,7 @@
               </a:bodyPr>
               <a:lstStyle/>
               <a:p>
+                <a:pPr/>
                 <a14:m>
                   <m:oMathPara xmlns:m="http://schemas.openxmlformats.org/officeDocument/2006/math">
                     <m:oMathParaPr>
@@ -6702,7 +9079,7 @@
             </p:txBody>
           </p:sp>
         </mc:Choice>
-        <mc:Fallback>
+        <mc:Fallback xmlns="">
           <p:sp>
             <p:nvSpPr>
               <p:cNvPr id="8" name="TextBox 7">
@@ -6791,8 +9168,8 @@
           </a:fontRef>
         </p:style>
       </p:cxnSp>
-      <mc:AlternateContent xmlns:mc="http://schemas.openxmlformats.org/markup-compatibility/2006">
-        <mc:Choice xmlns:a14="http://schemas.microsoft.com/office/drawing/2010/main" Requires="a14">
+      <mc:AlternateContent xmlns:mc="http://schemas.openxmlformats.org/markup-compatibility/2006" xmlns:a14="http://schemas.microsoft.com/office/drawing/2010/main">
+        <mc:Choice Requires="a14">
           <p:sp>
             <p:nvSpPr>
               <p:cNvPr id="10" name="TextBox 9">
@@ -6821,6 +9198,7 @@
               </a:bodyPr>
               <a:lstStyle/>
               <a:p>
+                <a:pPr/>
                 <a14:m>
                   <m:oMathPara xmlns:m="http://schemas.openxmlformats.org/officeDocument/2006/math">
                     <m:oMathParaPr>
@@ -6863,7 +9241,7 @@
             </p:txBody>
           </p:sp>
         </mc:Choice>
-        <mc:Fallback>
+        <mc:Fallback xmlns="">
           <p:sp>
             <p:nvSpPr>
               <p:cNvPr id="10" name="TextBox 9">
@@ -6959,8 +9337,8 @@
           </a:p>
         </p:txBody>
       </p:sp>
-      <mc:AlternateContent xmlns:mc="http://schemas.openxmlformats.org/markup-compatibility/2006">
-        <mc:Choice xmlns:a14="http://schemas.microsoft.com/office/drawing/2010/main" Requires="a14">
+      <mc:AlternateContent xmlns:mc="http://schemas.openxmlformats.org/markup-compatibility/2006" xmlns:a14="http://schemas.microsoft.com/office/drawing/2010/main">
+        <mc:Choice Requires="a14">
           <p:sp>
             <p:nvSpPr>
               <p:cNvPr id="12" name="TextBox 11">
@@ -7007,7 +9385,7 @@
             </p:txBody>
           </p:sp>
         </mc:Choice>
-        <mc:Fallback>
+        <mc:Fallback xmlns="">
           <p:sp>
             <p:nvSpPr>
               <p:cNvPr id="12" name="TextBox 11">
@@ -7121,7 +9499,762 @@
 </p:sld>
 </file>
 
-<file path=ppt/slides/slide6.xml><?xml version="1.0" encoding="utf-8"?>
+<file path=ppt/slides/slide8.xml><?xml version="1.0" encoding="utf-8"?>
+<p:sld xmlns:a="http://schemas.openxmlformats.org/drawingml/2006/main" xmlns:r="http://schemas.openxmlformats.org/officeDocument/2006/relationships" xmlns:p="http://schemas.openxmlformats.org/presentationml/2006/main">
+  <p:cSld>
+    <p:spTree>
+      <p:nvGrpSpPr>
+        <p:cNvPr id="1" name=""/>
+        <p:cNvGrpSpPr/>
+        <p:nvPr/>
+      </p:nvGrpSpPr>
+      <p:grpSpPr>
+        <a:xfrm>
+          <a:off x="0" y="0"/>
+          <a:ext cx="0" cy="0"/>
+          <a:chOff x="0" y="0"/>
+          <a:chExt cx="0" cy="0"/>
+        </a:xfrm>
+      </p:grpSpPr>
+      <p:cxnSp>
+        <p:nvCxnSpPr>
+          <p:cNvPr id="6" name="직선 화살표 연결선 5">
+            <a:extLst>
+              <a:ext uri="{FF2B5EF4-FFF2-40B4-BE49-F238E27FC236}">
+                <a16:creationId xmlns:a16="http://schemas.microsoft.com/office/drawing/2014/main" id="{250D614C-FA0A-48DD-91CE-341384E40539}"/>
+              </a:ext>
+            </a:extLst>
+          </p:cNvPr>
+          <p:cNvCxnSpPr/>
+          <p:nvPr/>
+        </p:nvCxnSpPr>
+        <p:spPr>
+          <a:xfrm flipH="1" flipV="1">
+            <a:off x="5106500" y="1972191"/>
+            <a:ext cx="1117600" cy="1503680"/>
+          </a:xfrm>
+          <a:prstGeom prst="straightConnector1">
+            <a:avLst/>
+          </a:prstGeom>
+          <a:ln w="38100">
+            <a:solidFill>
+              <a:schemeClr val="accent6"/>
+            </a:solidFill>
+            <a:tailEnd type="triangle"/>
+          </a:ln>
+        </p:spPr>
+        <p:style>
+          <a:lnRef idx="1">
+            <a:schemeClr val="accent1"/>
+          </a:lnRef>
+          <a:fillRef idx="0">
+            <a:schemeClr val="accent1"/>
+          </a:fillRef>
+          <a:effectRef idx="0">
+            <a:schemeClr val="accent1"/>
+          </a:effectRef>
+          <a:fontRef idx="minor">
+            <a:schemeClr val="tx1"/>
+          </a:fontRef>
+        </p:style>
+      </p:cxnSp>
+      <p:sp>
+        <p:nvSpPr>
+          <p:cNvPr id="4" name="원호 3">
+            <a:extLst>
+              <a:ext uri="{FF2B5EF4-FFF2-40B4-BE49-F238E27FC236}">
+                <a16:creationId xmlns:a16="http://schemas.microsoft.com/office/drawing/2014/main" id="{D1B52E39-80CE-470C-BFC4-E35034E6BAC8}"/>
+              </a:ext>
+            </a:extLst>
+          </p:cNvPr>
+          <p:cNvSpPr/>
+          <p:nvPr/>
+        </p:nvSpPr>
+        <p:spPr>
+          <a:xfrm>
+            <a:off x="2363300" y="2675263"/>
+            <a:ext cx="4348480" cy="4348480"/>
+          </a:xfrm>
+          <a:prstGeom prst="arc">
+            <a:avLst/>
+          </a:prstGeom>
+          <a:ln w="28575">
+            <a:solidFill>
+              <a:schemeClr val="tx1"/>
+            </a:solidFill>
+          </a:ln>
+        </p:spPr>
+        <p:style>
+          <a:lnRef idx="1">
+            <a:schemeClr val="accent1"/>
+          </a:lnRef>
+          <a:fillRef idx="0">
+            <a:schemeClr val="accent1"/>
+          </a:fillRef>
+          <a:effectRef idx="0">
+            <a:schemeClr val="accent1"/>
+          </a:effectRef>
+          <a:fontRef idx="minor">
+            <a:schemeClr val="tx1"/>
+          </a:fontRef>
+        </p:style>
+        <p:txBody>
+          <a:bodyPr rtlCol="0" anchor="ctr"/>
+          <a:lstStyle/>
+          <a:p>
+            <a:pPr algn="ctr"/>
+            <a:endParaRPr lang="ko-KR" altLang="en-US"/>
+          </a:p>
+        </p:txBody>
+      </p:sp>
+      <mc:AlternateContent xmlns:mc="http://schemas.openxmlformats.org/markup-compatibility/2006" xmlns:a14="http://schemas.microsoft.com/office/drawing/2010/main">
+        <mc:Choice Requires="a14">
+          <p:sp>
+            <p:nvSpPr>
+              <p:cNvPr id="7" name="TextBox 6">
+                <a:extLst>
+                  <a:ext uri="{FF2B5EF4-FFF2-40B4-BE49-F238E27FC236}">
+                    <a16:creationId xmlns:a16="http://schemas.microsoft.com/office/drawing/2014/main" id="{1493B17D-4EA2-4A4A-BD0F-75E9E5D8C285}"/>
+                  </a:ext>
+                </a:extLst>
+              </p:cNvPr>
+              <p:cNvSpPr txBox="1"/>
+              <p:nvPr/>
+            </p:nvSpPr>
+            <p:spPr>
+              <a:xfrm>
+                <a:off x="4283888" y="2724031"/>
+                <a:ext cx="669863" cy="369332"/>
+              </a:xfrm>
+              <a:prstGeom prst="rect">
+                <a:avLst/>
+              </a:prstGeom>
+              <a:noFill/>
+            </p:spPr>
+            <p:txBody>
+              <a:bodyPr wrap="none" rtlCol="0">
+                <a:spAutoFit/>
+              </a:bodyPr>
+              <a:lstStyle/>
+              <a:p>
+                <a:pPr/>
+                <a14:m>
+                  <m:oMathPara xmlns:m="http://schemas.openxmlformats.org/officeDocument/2006/math">
+                    <m:oMathParaPr>
+                      <m:jc m:val="centerGroup"/>
+                    </m:oMathParaPr>
+                    <m:oMath xmlns:m="http://schemas.openxmlformats.org/officeDocument/2006/math">
+                      <m:acc>
+                        <m:accPr>
+                          <m:chr m:val="⃗"/>
+                          <m:ctrlPr>
+                            <a:rPr lang="en-US" altLang="ko-KR" b="0" i="1" smtClean="0">
+                              <a:latin typeface="Cambria Math" panose="02040503050406030204" pitchFamily="18" charset="0"/>
+                            </a:rPr>
+                          </m:ctrlPr>
+                        </m:accPr>
+                        <m:e>
+                          <m:r>
+                            <a:rPr lang="en-US" altLang="ko-KR" b="0" i="1" smtClean="0">
+                              <a:latin typeface="Cambria Math" panose="02040503050406030204" pitchFamily="18" charset="0"/>
+                            </a:rPr>
+                            <m:t>𝑟</m:t>
+                          </m:r>
+                        </m:e>
+                      </m:acc>
+                      <m:r>
+                        <a:rPr lang="en-US" altLang="ko-KR" b="0" i="1" smtClean="0">
+                          <a:latin typeface="Cambria Math" panose="02040503050406030204" pitchFamily="18" charset="0"/>
+                        </a:rPr>
+                        <m:t>(</m:t>
+                      </m:r>
+                      <m:r>
+                        <a:rPr lang="en-US" altLang="ko-KR" b="0" i="1" smtClean="0">
+                          <a:latin typeface="Cambria Math" panose="02040503050406030204" pitchFamily="18" charset="0"/>
+                        </a:rPr>
+                        <m:t>𝑡</m:t>
+                      </m:r>
+                      <m:r>
+                        <a:rPr lang="en-US" altLang="ko-KR" b="0" i="1" smtClean="0">
+                          <a:latin typeface="Cambria Math" panose="02040503050406030204" pitchFamily="18" charset="0"/>
+                        </a:rPr>
+                        <m:t>)</m:t>
+                      </m:r>
+                    </m:oMath>
+                  </m:oMathPara>
+                </a14:m>
+                <a:endParaRPr lang="ko-KR" altLang="en-US" dirty="0"/>
+              </a:p>
+            </p:txBody>
+          </p:sp>
+        </mc:Choice>
+        <mc:Fallback xmlns="">
+          <p:sp>
+            <p:nvSpPr>
+              <p:cNvPr id="7" name="TextBox 6">
+                <a:extLst>
+                  <a:ext uri="{FF2B5EF4-FFF2-40B4-BE49-F238E27FC236}">
+                    <a16:creationId xmlns:a16="http://schemas.microsoft.com/office/drawing/2014/main" id="{1493B17D-4EA2-4A4A-BD0F-75E9E5D8C285}"/>
+                  </a:ext>
+                </a:extLst>
+              </p:cNvPr>
+              <p:cNvSpPr txBox="1">
+                <a:spLocks noRot="1" noChangeAspect="1" noMove="1" noResize="1" noEditPoints="1" noAdjustHandles="1" noChangeArrowheads="1" noChangeShapeType="1" noTextEdit="1"/>
+              </p:cNvSpPr>
+              <p:nvPr/>
+            </p:nvSpPr>
+            <p:spPr>
+              <a:xfrm>
+                <a:off x="4283888" y="2724031"/>
+                <a:ext cx="669863" cy="369332"/>
+              </a:xfrm>
+              <a:prstGeom prst="rect">
+                <a:avLst/>
+              </a:prstGeom>
+              <a:blipFill>
+                <a:blip r:embed="rId2"/>
+                <a:stretch>
+                  <a:fillRect t="-20000" b="-16667"/>
+                </a:stretch>
+              </a:blipFill>
+            </p:spPr>
+            <p:txBody>
+              <a:bodyPr/>
+              <a:lstStyle/>
+              <a:p>
+                <a:r>
+                  <a:rPr lang="ko-KR" altLang="en-US">
+                    <a:noFill/>
+                  </a:rPr>
+                  <a:t> </a:t>
+                </a:r>
+              </a:p>
+            </p:txBody>
+          </p:sp>
+        </mc:Fallback>
+      </mc:AlternateContent>
+      <mc:AlternateContent xmlns:mc="http://schemas.openxmlformats.org/markup-compatibility/2006" xmlns:a14="http://schemas.microsoft.com/office/drawing/2010/main">
+        <mc:Choice Requires="a14">
+          <p:sp>
+            <p:nvSpPr>
+              <p:cNvPr id="8" name="TextBox 7">
+                <a:extLst>
+                  <a:ext uri="{FF2B5EF4-FFF2-40B4-BE49-F238E27FC236}">
+                    <a16:creationId xmlns:a16="http://schemas.microsoft.com/office/drawing/2014/main" id="{5A1C805B-1A59-429C-9BB0-A94FFD73CD72}"/>
+                  </a:ext>
+                </a:extLst>
+              </p:cNvPr>
+              <p:cNvSpPr txBox="1"/>
+              <p:nvPr/>
+            </p:nvSpPr>
+            <p:spPr>
+              <a:xfrm>
+                <a:off x="4757141" y="1602859"/>
+                <a:ext cx="698717" cy="402931"/>
+              </a:xfrm>
+              <a:prstGeom prst="rect">
+                <a:avLst/>
+              </a:prstGeom>
+              <a:noFill/>
+            </p:spPr>
+            <p:txBody>
+              <a:bodyPr wrap="none" rtlCol="0">
+                <a:spAutoFit/>
+              </a:bodyPr>
+              <a:lstStyle/>
+              <a:p>
+                <a:pPr/>
+                <a14:m>
+                  <m:oMathPara xmlns:m="http://schemas.openxmlformats.org/officeDocument/2006/math">
+                    <m:oMathParaPr>
+                      <m:jc m:val="centerGroup"/>
+                    </m:oMathParaPr>
+                    <m:oMath xmlns:m="http://schemas.openxmlformats.org/officeDocument/2006/math">
+                      <m:acc>
+                        <m:accPr>
+                          <m:chr m:val="⃗"/>
+                          <m:ctrlPr>
+                            <a:rPr lang="en-US" altLang="ko-KR" b="0" i="1" smtClean="0">
+                              <a:solidFill>
+                                <a:schemeClr val="accent6"/>
+                              </a:solidFill>
+                              <a:latin typeface="Cambria Math" panose="02040503050406030204" pitchFamily="18" charset="0"/>
+                            </a:rPr>
+                          </m:ctrlPr>
+                        </m:accPr>
+                        <m:e>
+                          <m:r>
+                            <a:rPr lang="en-US" altLang="ko-KR" b="0" i="1" smtClean="0">
+                              <a:solidFill>
+                                <a:schemeClr val="accent6"/>
+                              </a:solidFill>
+                              <a:latin typeface="Cambria Math" panose="02040503050406030204" pitchFamily="18" charset="0"/>
+                            </a:rPr>
+                            <m:t>𝑇</m:t>
+                          </m:r>
+                        </m:e>
+                      </m:acc>
+                      <m:r>
+                        <a:rPr lang="en-US" altLang="ko-KR" b="0" i="1" smtClean="0">
+                          <a:solidFill>
+                            <a:schemeClr val="accent6"/>
+                          </a:solidFill>
+                          <a:latin typeface="Cambria Math" panose="02040503050406030204" pitchFamily="18" charset="0"/>
+                        </a:rPr>
+                        <m:t>(</m:t>
+                      </m:r>
+                      <m:r>
+                        <a:rPr lang="en-US" altLang="ko-KR" b="0" i="1" smtClean="0">
+                          <a:solidFill>
+                            <a:schemeClr val="accent6"/>
+                          </a:solidFill>
+                          <a:latin typeface="Cambria Math" panose="02040503050406030204" pitchFamily="18" charset="0"/>
+                        </a:rPr>
+                        <m:t>𝑡</m:t>
+                      </m:r>
+                      <m:r>
+                        <a:rPr lang="en-US" altLang="ko-KR" b="0" i="1" smtClean="0">
+                          <a:solidFill>
+                            <a:schemeClr val="accent6"/>
+                          </a:solidFill>
+                          <a:latin typeface="Cambria Math" panose="02040503050406030204" pitchFamily="18" charset="0"/>
+                        </a:rPr>
+                        <m:t>)</m:t>
+                      </m:r>
+                    </m:oMath>
+                  </m:oMathPara>
+                </a14:m>
+                <a:endParaRPr lang="ko-KR" altLang="en-US" dirty="0">
+                  <a:solidFill>
+                    <a:schemeClr val="accent6"/>
+                  </a:solidFill>
+                </a:endParaRPr>
+              </a:p>
+            </p:txBody>
+          </p:sp>
+        </mc:Choice>
+        <mc:Fallback xmlns="">
+          <p:sp>
+            <p:nvSpPr>
+              <p:cNvPr id="8" name="TextBox 7">
+                <a:extLst>
+                  <a:ext uri="{FF2B5EF4-FFF2-40B4-BE49-F238E27FC236}">
+                    <a16:creationId xmlns:a16="http://schemas.microsoft.com/office/drawing/2014/main" id="{5A1C805B-1A59-429C-9BB0-A94FFD73CD72}"/>
+                  </a:ext>
+                </a:extLst>
+              </p:cNvPr>
+              <p:cNvSpPr txBox="1">
+                <a:spLocks noRot="1" noChangeAspect="1" noMove="1" noResize="1" noEditPoints="1" noAdjustHandles="1" noChangeArrowheads="1" noChangeShapeType="1" noTextEdit="1"/>
+              </p:cNvSpPr>
+              <p:nvPr/>
+            </p:nvSpPr>
+            <p:spPr>
+              <a:xfrm>
+                <a:off x="4757141" y="1602859"/>
+                <a:ext cx="698717" cy="402931"/>
+              </a:xfrm>
+              <a:prstGeom prst="rect">
+                <a:avLst/>
+              </a:prstGeom>
+              <a:blipFill>
+                <a:blip r:embed="rId3"/>
+                <a:stretch>
+                  <a:fillRect b="-13636"/>
+                </a:stretch>
+              </a:blipFill>
+            </p:spPr>
+            <p:txBody>
+              <a:bodyPr/>
+              <a:lstStyle/>
+              <a:p>
+                <a:r>
+                  <a:rPr lang="ko-KR" altLang="en-US">
+                    <a:noFill/>
+                  </a:rPr>
+                  <a:t> </a:t>
+                </a:r>
+              </a:p>
+            </p:txBody>
+          </p:sp>
+        </mc:Fallback>
+      </mc:AlternateContent>
+      <p:cxnSp>
+        <p:nvCxnSpPr>
+          <p:cNvPr id="9" name="직선 화살표 연결선 8">
+            <a:extLst>
+              <a:ext uri="{FF2B5EF4-FFF2-40B4-BE49-F238E27FC236}">
+                <a16:creationId xmlns:a16="http://schemas.microsoft.com/office/drawing/2014/main" id="{8FF678F9-BE85-4440-B458-7119E9C09F0D}"/>
+              </a:ext>
+            </a:extLst>
+          </p:cNvPr>
+          <p:cNvCxnSpPr>
+            <a:cxnSpLocks/>
+          </p:cNvCxnSpPr>
+          <p:nvPr/>
+        </p:nvCxnSpPr>
+        <p:spPr>
+          <a:xfrm rot="5400000" flipH="1" flipV="1">
+            <a:off x="6417140" y="2165231"/>
+            <a:ext cx="1117600" cy="1503680"/>
+          </a:xfrm>
+          <a:prstGeom prst="straightConnector1">
+            <a:avLst/>
+          </a:prstGeom>
+          <a:ln w="38100">
+            <a:solidFill>
+              <a:srgbClr val="FF0000"/>
+            </a:solidFill>
+            <a:tailEnd type="triangle"/>
+          </a:ln>
+        </p:spPr>
+        <p:style>
+          <a:lnRef idx="1">
+            <a:schemeClr val="accent1"/>
+          </a:lnRef>
+          <a:fillRef idx="0">
+            <a:schemeClr val="accent1"/>
+          </a:fillRef>
+          <a:effectRef idx="0">
+            <a:schemeClr val="accent1"/>
+          </a:effectRef>
+          <a:fontRef idx="minor">
+            <a:schemeClr val="tx1"/>
+          </a:fontRef>
+        </p:style>
+      </p:cxnSp>
+      <mc:AlternateContent xmlns:mc="http://schemas.openxmlformats.org/markup-compatibility/2006" xmlns:a14="http://schemas.microsoft.com/office/drawing/2010/main">
+        <mc:Choice Requires="a14">
+          <p:sp>
+            <p:nvSpPr>
+              <p:cNvPr id="10" name="TextBox 9">
+                <a:extLst>
+                  <a:ext uri="{FF2B5EF4-FFF2-40B4-BE49-F238E27FC236}">
+                    <a16:creationId xmlns:a16="http://schemas.microsoft.com/office/drawing/2014/main" id="{4C6E8074-D3A3-4114-A5D5-760314B5B573}"/>
+                  </a:ext>
+                </a:extLst>
+              </p:cNvPr>
+              <p:cNvSpPr txBox="1"/>
+              <p:nvPr/>
+            </p:nvSpPr>
+            <p:spPr>
+              <a:xfrm>
+                <a:off x="7501629" y="1890164"/>
+                <a:ext cx="475258" cy="461665"/>
+              </a:xfrm>
+              <a:prstGeom prst="rect">
+                <a:avLst/>
+              </a:prstGeom>
+              <a:noFill/>
+            </p:spPr>
+            <p:txBody>
+              <a:bodyPr wrap="none" rtlCol="0">
+                <a:spAutoFit/>
+              </a:bodyPr>
+              <a:lstStyle/>
+              <a:p>
+                <a:pPr/>
+                <a14:m>
+                  <m:oMathPara xmlns:m="http://schemas.openxmlformats.org/officeDocument/2006/math">
+                    <m:oMathParaPr>
+                      <m:jc m:val="centerGroup"/>
+                    </m:oMathParaPr>
+                    <m:oMath xmlns:m="http://schemas.openxmlformats.org/officeDocument/2006/math">
+                      <m:acc>
+                        <m:accPr>
+                          <m:chr m:val="̂"/>
+                          <m:ctrlPr>
+                            <a:rPr lang="en-US" altLang="ko-KR" sz="2400" b="0" i="1" smtClean="0">
+                              <a:solidFill>
+                                <a:srgbClr val="FF0000"/>
+                              </a:solidFill>
+                              <a:latin typeface="Cambria Math" panose="02040503050406030204" pitchFamily="18" charset="0"/>
+                            </a:rPr>
+                          </m:ctrlPr>
+                        </m:accPr>
+                        <m:e>
+                          <m:r>
+                            <a:rPr lang="en-US" altLang="ko-KR" sz="2400" b="0" i="1" smtClean="0">
+                              <a:solidFill>
+                                <a:srgbClr val="FF0000"/>
+                              </a:solidFill>
+                              <a:latin typeface="Cambria Math" panose="02040503050406030204" pitchFamily="18" charset="0"/>
+                            </a:rPr>
+                            <m:t>𝑛</m:t>
+                          </m:r>
+                        </m:e>
+                      </m:acc>
+                    </m:oMath>
+                  </m:oMathPara>
+                </a14:m>
+                <a:endParaRPr lang="ko-KR" altLang="en-US" sz="2400" dirty="0">
+                  <a:solidFill>
+                    <a:srgbClr val="FF0000"/>
+                  </a:solidFill>
+                </a:endParaRPr>
+              </a:p>
+            </p:txBody>
+          </p:sp>
+        </mc:Choice>
+        <mc:Fallback xmlns="">
+          <p:sp>
+            <p:nvSpPr>
+              <p:cNvPr id="10" name="TextBox 9">
+                <a:extLst>
+                  <a:ext uri="{FF2B5EF4-FFF2-40B4-BE49-F238E27FC236}">
+                    <a16:creationId xmlns:a16="http://schemas.microsoft.com/office/drawing/2014/main" id="{4C6E8074-D3A3-4114-A5D5-760314B5B573}"/>
+                  </a:ext>
+                </a:extLst>
+              </p:cNvPr>
+              <p:cNvSpPr txBox="1">
+                <a:spLocks noRot="1" noChangeAspect="1" noMove="1" noResize="1" noEditPoints="1" noAdjustHandles="1" noChangeArrowheads="1" noChangeShapeType="1" noTextEdit="1"/>
+              </p:cNvSpPr>
+              <p:nvPr/>
+            </p:nvSpPr>
+            <p:spPr>
+              <a:xfrm>
+                <a:off x="7501629" y="1890164"/>
+                <a:ext cx="475258" cy="461665"/>
+              </a:xfrm>
+              <a:prstGeom prst="rect">
+                <a:avLst/>
+              </a:prstGeom>
+              <a:blipFill>
+                <a:blip r:embed="rId4"/>
+                <a:stretch>
+                  <a:fillRect t="-1316" r="-23077"/>
+                </a:stretch>
+              </a:blipFill>
+            </p:spPr>
+            <p:txBody>
+              <a:bodyPr/>
+              <a:lstStyle/>
+              <a:p>
+                <a:r>
+                  <a:rPr lang="ko-KR" altLang="en-US">
+                    <a:noFill/>
+                  </a:rPr>
+                  <a:t> </a:t>
+                </a:r>
+              </a:p>
+            </p:txBody>
+          </p:sp>
+        </mc:Fallback>
+      </mc:AlternateContent>
+      <p:sp>
+        <p:nvSpPr>
+          <p:cNvPr id="11" name="원호 10">
+            <a:extLst>
+              <a:ext uri="{FF2B5EF4-FFF2-40B4-BE49-F238E27FC236}">
+                <a16:creationId xmlns:a16="http://schemas.microsoft.com/office/drawing/2014/main" id="{4AB082A8-011A-4153-B283-E9BBCF2B80A3}"/>
+              </a:ext>
+            </a:extLst>
+          </p:cNvPr>
+          <p:cNvSpPr/>
+          <p:nvPr/>
+        </p:nvSpPr>
+        <p:spPr>
+          <a:xfrm rot="19779688">
+            <a:off x="5459918" y="2383508"/>
+            <a:ext cx="1426062" cy="1426062"/>
+          </a:xfrm>
+          <a:prstGeom prst="arc">
+            <a:avLst/>
+          </a:prstGeom>
+          <a:ln w="28575">
+            <a:solidFill>
+              <a:schemeClr val="tx1"/>
+            </a:solidFill>
+            <a:headEnd type="none" w="med" len="med"/>
+            <a:tailEnd type="arrow" w="med" len="med"/>
+          </a:ln>
+        </p:spPr>
+        <p:style>
+          <a:lnRef idx="1">
+            <a:schemeClr val="accent1"/>
+          </a:lnRef>
+          <a:fillRef idx="0">
+            <a:schemeClr val="accent1"/>
+          </a:fillRef>
+          <a:effectRef idx="0">
+            <a:schemeClr val="accent1"/>
+          </a:effectRef>
+          <a:fontRef idx="minor">
+            <a:schemeClr val="tx1"/>
+          </a:fontRef>
+        </p:style>
+        <p:txBody>
+          <a:bodyPr rtlCol="0" anchor="ctr"/>
+          <a:lstStyle/>
+          <a:p>
+            <a:pPr algn="ctr"/>
+            <a:endParaRPr lang="ko-KR" altLang="en-US"/>
+          </a:p>
+        </p:txBody>
+      </p:sp>
+      <mc:AlternateContent xmlns:mc="http://schemas.openxmlformats.org/markup-compatibility/2006">
+        <mc:Choice xmlns:a14="http://schemas.microsoft.com/office/drawing/2010/main" Requires="a14">
+          <p:sp>
+            <p:nvSpPr>
+              <p:cNvPr id="12" name="TextBox 11">
+                <a:extLst>
+                  <a:ext uri="{FF2B5EF4-FFF2-40B4-BE49-F238E27FC236}">
+                    <a16:creationId xmlns:a16="http://schemas.microsoft.com/office/drawing/2014/main" id="{5077F622-8FAB-4671-A1F8-C3F56B0F7E52}"/>
+                  </a:ext>
+                </a:extLst>
+              </p:cNvPr>
+              <p:cNvSpPr txBox="1"/>
+              <p:nvPr/>
+            </p:nvSpPr>
+            <p:spPr>
+              <a:xfrm>
+                <a:off x="5731689" y="1982497"/>
+                <a:ext cx="1456296" cy="369332"/>
+              </a:xfrm>
+              <a:prstGeom prst="rect">
+                <a:avLst/>
+              </a:prstGeom>
+              <a:noFill/>
+            </p:spPr>
+            <p:txBody>
+              <a:bodyPr wrap="none" rtlCol="0">
+                <a:spAutoFit/>
+              </a:bodyPr>
+              <a:lstStyle/>
+              <a:p>
+                <a:r>
+                  <a:rPr lang="en-US" altLang="ko-KR" b="0" dirty="0"/>
+                  <a:t>Rotate </a:t>
+                </a:r>
+                <a14:m>
+                  <m:oMath xmlns:m="http://schemas.openxmlformats.org/officeDocument/2006/math">
+                    <m:r>
+                      <a:rPr lang="en-US" altLang="ko-KR" b="0" i="1" smtClean="0">
+                        <a:latin typeface="Cambria Math" panose="02040503050406030204" pitchFamily="18" charset="0"/>
+                      </a:rPr>
+                      <m:t>−90°</m:t>
+                    </m:r>
+                  </m:oMath>
+                </a14:m>
+                <a:endParaRPr lang="ko-KR" altLang="en-US" dirty="0"/>
+              </a:p>
+            </p:txBody>
+          </p:sp>
+        </mc:Choice>
+        <mc:Fallback>
+          <p:sp>
+            <p:nvSpPr>
+              <p:cNvPr id="12" name="TextBox 11">
+                <a:extLst>
+                  <a:ext uri="{FF2B5EF4-FFF2-40B4-BE49-F238E27FC236}">
+                    <a16:creationId xmlns:a16="http://schemas.microsoft.com/office/drawing/2014/main" id="{5077F622-8FAB-4671-A1F8-C3F56B0F7E52}"/>
+                  </a:ext>
+                </a:extLst>
+              </p:cNvPr>
+              <p:cNvSpPr txBox="1">
+                <a:spLocks noRot="1" noChangeAspect="1" noMove="1" noResize="1" noEditPoints="1" noAdjustHandles="1" noChangeArrowheads="1" noChangeShapeType="1" noTextEdit="1"/>
+              </p:cNvSpPr>
+              <p:nvPr/>
+            </p:nvSpPr>
+            <p:spPr>
+              <a:xfrm>
+                <a:off x="5731689" y="1982497"/>
+                <a:ext cx="1456296" cy="369332"/>
+              </a:xfrm>
+              <a:prstGeom prst="rect">
+                <a:avLst/>
+              </a:prstGeom>
+              <a:blipFill>
+                <a:blip r:embed="rId5"/>
+                <a:stretch>
+                  <a:fillRect l="-3347" t="-8197" b="-24590"/>
+                </a:stretch>
+              </a:blipFill>
+            </p:spPr>
+            <p:txBody>
+              <a:bodyPr/>
+              <a:lstStyle/>
+              <a:p>
+                <a:r>
+                  <a:rPr lang="en-US">
+                    <a:noFill/>
+                  </a:rPr>
+                  <a:t> </a:t>
+                </a:r>
+              </a:p>
+            </p:txBody>
+          </p:sp>
+        </mc:Fallback>
+      </mc:AlternateContent>
+      <p:sp>
+        <p:nvSpPr>
+          <p:cNvPr id="16" name="갈매기형 수장 12">
+            <a:extLst>
+              <a:ext uri="{FF2B5EF4-FFF2-40B4-BE49-F238E27FC236}">
+                <a16:creationId xmlns:a16="http://schemas.microsoft.com/office/drawing/2014/main" id="{441CDB6B-9DB9-483B-B714-096588AF810E}"/>
+              </a:ext>
+            </a:extLst>
+          </p:cNvPr>
+          <p:cNvSpPr/>
+          <p:nvPr/>
+        </p:nvSpPr>
+        <p:spPr>
+          <a:xfrm rot="11559554">
+            <a:off x="4946997" y="2582555"/>
+            <a:ext cx="193475" cy="307800"/>
+          </a:xfrm>
+          <a:prstGeom prst="chevron">
+            <a:avLst/>
+          </a:prstGeom>
+          <a:solidFill>
+            <a:schemeClr val="tx1"/>
+          </a:solidFill>
+          <a:ln>
+            <a:noFill/>
+          </a:ln>
+        </p:spPr>
+        <p:style>
+          <a:lnRef idx="2">
+            <a:schemeClr val="accent1">
+              <a:shade val="50000"/>
+            </a:schemeClr>
+          </a:lnRef>
+          <a:fillRef idx="1">
+            <a:schemeClr val="accent1"/>
+          </a:fillRef>
+          <a:effectRef idx="0">
+            <a:schemeClr val="accent1"/>
+          </a:effectRef>
+          <a:fontRef idx="minor">
+            <a:schemeClr val="lt1"/>
+          </a:fontRef>
+        </p:style>
+        <p:txBody>
+          <a:bodyPr rtlCol="0" anchor="ctr"/>
+          <a:lstStyle/>
+          <a:p>
+            <a:pPr algn="ctr"/>
+            <a:endParaRPr lang="ko-KR" altLang="en-US">
+              <a:solidFill>
+                <a:schemeClr val="tx1"/>
+              </a:solidFill>
+            </a:endParaRPr>
+          </a:p>
+        </p:txBody>
+      </p:sp>
+    </p:spTree>
+    <p:extLst>
+      <p:ext uri="{BB962C8B-B14F-4D97-AF65-F5344CB8AC3E}">
+        <p14:creationId xmlns:p14="http://schemas.microsoft.com/office/powerpoint/2010/main" val="2123327250"/>
+      </p:ext>
+    </p:extLst>
+  </p:cSld>
+  <p:clrMapOvr>
+    <a:masterClrMapping/>
+  </p:clrMapOvr>
+</p:sld>
+</file>
+
+<file path=ppt/slides/slide9.xml><?xml version="1.0" encoding="utf-8"?>
 <p:sld xmlns:a="http://schemas.openxmlformats.org/drawingml/2006/main" xmlns:r="http://schemas.openxmlformats.org/officeDocument/2006/relationships" xmlns:p="http://schemas.openxmlformats.org/presentationml/2006/main">
   <p:cSld>
     <p:spTree>

</xml_diff>